<commit_message>
Update presentation with new idea
</commit_message>
<xml_diff>
--- a/Presentation/VoiceAndMore.pptx
+++ b/Presentation/VoiceAndMore.pptx
@@ -7,13 +7,16 @@
   <p:sldIdLst>
     <p:sldId id="256" r:id="rId2"/>
     <p:sldId id="264" r:id="rId3"/>
-    <p:sldId id="257" r:id="rId4"/>
-    <p:sldId id="258" r:id="rId5"/>
-    <p:sldId id="263" r:id="rId6"/>
-    <p:sldId id="259" r:id="rId7"/>
-    <p:sldId id="260" r:id="rId8"/>
-    <p:sldId id="261" r:id="rId9"/>
-    <p:sldId id="262" r:id="rId10"/>
+    <p:sldId id="267" r:id="rId4"/>
+    <p:sldId id="265" r:id="rId5"/>
+    <p:sldId id="269" r:id="rId6"/>
+    <p:sldId id="268" r:id="rId7"/>
+    <p:sldId id="258" r:id="rId8"/>
+    <p:sldId id="263" r:id="rId9"/>
+    <p:sldId id="259" r:id="rId10"/>
+    <p:sldId id="260" r:id="rId11"/>
+    <p:sldId id="261" r:id="rId12"/>
+    <p:sldId id="262" r:id="rId13"/>
   </p:sldIdLst>
   <p:sldSz cx="12192000" cy="6858000"/>
   <p:notesSz cx="6858000" cy="9144000"/>
@@ -112,6 +115,11 @@
       </a:defRPr>
     </a:lvl9pPr>
   </p:defaultTextStyle>
+  <p:extLst>
+    <p:ext uri="{EFAFB233-063F-42B5-8137-9DF3F51BA10A}">
+      <p15:sldGuideLst xmlns:p15="http://schemas.microsoft.com/office/powerpoint/2012/main"/>
+    </p:ext>
+  </p:extLst>
 </p:presentation>
 </file>
 
@@ -4391,7 +4399,7 @@
           <a:p>
             <a:fld id="{48A87A34-81AB-432B-8DAE-1953F412C126}" type="datetimeFigureOut">
               <a:rPr lang="en-US" smtClean="0"/>
-              <a:t>2/24/2018</a:t>
+              <a:t>3/13/18</a:t>
             </a:fld>
             <a:endParaRPr lang="en-US" dirty="0"/>
           </a:p>
@@ -4658,7 +4666,7 @@
           <a:p>
             <a:fld id="{48A87A34-81AB-432B-8DAE-1953F412C126}" type="datetimeFigureOut">
               <a:rPr lang="en-US" smtClean="0"/>
-              <a:t>2/24/2018</a:t>
+              <a:t>3/13/18</a:t>
             </a:fld>
             <a:endParaRPr lang="en-US" dirty="0"/>
           </a:p>
@@ -4860,7 +4868,7 @@
           <a:p>
             <a:fld id="{48A87A34-81AB-432B-8DAE-1953F412C126}" type="datetimeFigureOut">
               <a:rPr lang="en-US" smtClean="0"/>
-              <a:t>2/24/2018</a:t>
+              <a:t>3/13/18</a:t>
             </a:fld>
             <a:endParaRPr lang="en-US" dirty="0"/>
           </a:p>
@@ -5123,7 +5131,7 @@
           <a:p>
             <a:fld id="{48A87A34-81AB-432B-8DAE-1953F412C126}" type="datetimeFigureOut">
               <a:rPr lang="en-US" smtClean="0"/>
-              <a:t>2/24/2018</a:t>
+              <a:t>3/13/18</a:t>
             </a:fld>
             <a:endParaRPr lang="en-US" dirty="0"/>
           </a:p>
@@ -5557,7 +5565,7 @@
           <a:p>
             <a:fld id="{48A87A34-81AB-432B-8DAE-1953F412C126}" type="datetimeFigureOut">
               <a:rPr lang="en-US" smtClean="0"/>
-              <a:t>2/24/2018</a:t>
+              <a:t>3/13/18</a:t>
             </a:fld>
             <a:endParaRPr lang="en-US" dirty="0"/>
           </a:p>
@@ -6103,7 +6111,7 @@
           <a:p>
             <a:fld id="{48A87A34-81AB-432B-8DAE-1953F412C126}" type="datetimeFigureOut">
               <a:rPr lang="en-US" smtClean="0"/>
-              <a:t>2/24/2018</a:t>
+              <a:t>3/13/18</a:t>
             </a:fld>
             <a:endParaRPr lang="en-US" dirty="0"/>
           </a:p>
@@ -6823,7 +6831,7 @@
           <a:p>
             <a:fld id="{48A87A34-81AB-432B-8DAE-1953F412C126}" type="datetimeFigureOut">
               <a:rPr lang="en-US" smtClean="0"/>
-              <a:t>2/24/2018</a:t>
+              <a:t>3/13/18</a:t>
             </a:fld>
             <a:endParaRPr lang="en-US" dirty="0"/>
           </a:p>
@@ -6993,7 +7001,7 @@
           <a:p>
             <a:fld id="{48A87A34-81AB-432B-8DAE-1953F412C126}" type="datetimeFigureOut">
               <a:rPr lang="en-US" smtClean="0"/>
-              <a:t>2/24/2018</a:t>
+              <a:t>3/13/18</a:t>
             </a:fld>
             <a:endParaRPr lang="en-US" dirty="0"/>
           </a:p>
@@ -7173,7 +7181,7 @@
           <a:p>
             <a:fld id="{48A87A34-81AB-432B-8DAE-1953F412C126}" type="datetimeFigureOut">
               <a:rPr lang="en-US" smtClean="0"/>
-              <a:t>2/24/2018</a:t>
+              <a:t>3/13/18</a:t>
             </a:fld>
             <a:endParaRPr lang="en-US" dirty="0"/>
           </a:p>
@@ -7343,7 +7351,7 @@
           <a:p>
             <a:fld id="{48A87A34-81AB-432B-8DAE-1953F412C126}" type="datetimeFigureOut">
               <a:rPr lang="en-US" smtClean="0"/>
-              <a:t>2/24/2018</a:t>
+              <a:t>3/13/18</a:t>
             </a:fld>
             <a:endParaRPr lang="en-US" dirty="0"/>
           </a:p>
@@ -7599,7 +7607,7 @@
           <a:p>
             <a:fld id="{48A87A34-81AB-432B-8DAE-1953F412C126}" type="datetimeFigureOut">
               <a:rPr lang="en-US" smtClean="0"/>
-              <a:t>2/24/2018</a:t>
+              <a:t>3/13/18</a:t>
             </a:fld>
             <a:endParaRPr lang="en-US" dirty="0"/>
           </a:p>
@@ -7837,7 +7845,7 @@
           <a:p>
             <a:fld id="{48A87A34-81AB-432B-8DAE-1953F412C126}" type="datetimeFigureOut">
               <a:rPr lang="en-US" smtClean="0"/>
-              <a:t>2/24/2018</a:t>
+              <a:t>3/13/18</a:t>
             </a:fld>
             <a:endParaRPr lang="en-US" dirty="0"/>
           </a:p>
@@ -8224,7 +8232,7 @@
           <a:p>
             <a:fld id="{48A87A34-81AB-432B-8DAE-1953F412C126}" type="datetimeFigureOut">
               <a:rPr lang="en-US" smtClean="0"/>
-              <a:t>2/24/2018</a:t>
+              <a:t>3/13/18</a:t>
             </a:fld>
             <a:endParaRPr lang="en-US" dirty="0"/>
           </a:p>
@@ -8348,7 +8356,7 @@
           <a:p>
             <a:fld id="{48A87A34-81AB-432B-8DAE-1953F412C126}" type="datetimeFigureOut">
               <a:rPr lang="en-US" smtClean="0"/>
-              <a:t>2/24/2018</a:t>
+              <a:t>3/13/18</a:t>
             </a:fld>
             <a:endParaRPr lang="en-US" dirty="0"/>
           </a:p>
@@ -8449,7 +8457,7 @@
           <a:p>
             <a:fld id="{48A87A34-81AB-432B-8DAE-1953F412C126}" type="datetimeFigureOut">
               <a:rPr lang="en-US" smtClean="0"/>
-              <a:t>2/24/2018</a:t>
+              <a:t>3/13/18</a:t>
             </a:fld>
             <a:endParaRPr lang="en-US" dirty="0"/>
           </a:p>
@@ -8704,7 +8712,7 @@
           <a:p>
             <a:fld id="{48A87A34-81AB-432B-8DAE-1953F412C126}" type="datetimeFigureOut">
               <a:rPr lang="en-US" smtClean="0"/>
-              <a:t>2/24/2018</a:t>
+              <a:t>3/13/18</a:t>
             </a:fld>
             <a:endParaRPr lang="en-US" dirty="0"/>
           </a:p>
@@ -8984,7 +8992,7 @@
           <a:p>
             <a:fld id="{48A87A34-81AB-432B-8DAE-1953F412C126}" type="datetimeFigureOut">
               <a:rPr lang="en-US" smtClean="0"/>
-              <a:t>2/24/2018</a:t>
+              <a:t>3/13/18</a:t>
             </a:fld>
             <a:endParaRPr lang="en-US" dirty="0"/>
           </a:p>
@@ -12068,7 +12076,7 @@
             <a:fld id="{48A87A34-81AB-432B-8DAE-1953F412C126}" type="datetimeFigureOut">
               <a:rPr lang="en-US" smtClean="0"/>
               <a:pPr/>
-              <a:t>2/24/2018</a:t>
+              <a:t>3/13/18</a:t>
             </a:fld>
             <a:endParaRPr lang="en-US" dirty="0"/>
           </a:p>
@@ -12562,6 +12570,216 @@
 </p:sld>
 </file>
 
+<file path=ppt/slides/slide10.xml><?xml version="1.0" encoding="utf-8"?>
+<p:sld xmlns:a="http://schemas.openxmlformats.org/drawingml/2006/main" xmlns:r="http://schemas.openxmlformats.org/officeDocument/2006/relationships" xmlns:p="http://schemas.openxmlformats.org/presentationml/2006/main">
+  <p:cSld>
+    <p:spTree>
+      <p:nvGrpSpPr>
+        <p:cNvPr id="1" name=""/>
+        <p:cNvGrpSpPr/>
+        <p:nvPr/>
+      </p:nvGrpSpPr>
+      <p:grpSpPr>
+        <a:xfrm>
+          <a:off x="0" y="0"/>
+          <a:ext cx="0" cy="0"/>
+          <a:chOff x="0" y="0"/>
+          <a:chExt cx="0" cy="0"/>
+        </a:xfrm>
+      </p:grpSpPr>
+      <p:sp>
+        <p:nvSpPr>
+          <p:cNvPr id="2" name="Title 1"/>
+          <p:cNvSpPr>
+            <a:spLocks noGrp="1"/>
+          </p:cNvSpPr>
+          <p:nvPr>
+            <p:ph type="title"/>
+          </p:nvPr>
+        </p:nvSpPr>
+        <p:spPr/>
+        <p:txBody>
+          <a:bodyPr/>
+          <a:lstStyle/>
+          <a:p>
+            <a:r>
+              <a:rPr lang="en-GB" dirty="0"/>
+              <a:t>Gadget Controller</a:t>
+            </a:r>
+          </a:p>
+        </p:txBody>
+      </p:sp>
+      <p:sp>
+        <p:nvSpPr>
+          <p:cNvPr id="3" name="Content Placeholder 2"/>
+          <p:cNvSpPr>
+            <a:spLocks noGrp="1"/>
+          </p:cNvSpPr>
+          <p:nvPr>
+            <p:ph idx="1"/>
+          </p:nvPr>
+        </p:nvSpPr>
+        <p:spPr/>
+        <p:txBody>
+          <a:bodyPr/>
+          <a:lstStyle/>
+          <a:p>
+            <a:endParaRPr lang="en-GB"/>
+          </a:p>
+        </p:txBody>
+      </p:sp>
+    </p:spTree>
+    <p:extLst>
+      <p:ext uri="{BB962C8B-B14F-4D97-AF65-F5344CB8AC3E}">
+        <p14:creationId xmlns:p14="http://schemas.microsoft.com/office/powerpoint/2010/main" val="2066721731"/>
+      </p:ext>
+    </p:extLst>
+  </p:cSld>
+  <p:clrMapOvr>
+    <a:masterClrMapping/>
+  </p:clrMapOvr>
+</p:sld>
+</file>
+
+<file path=ppt/slides/slide11.xml><?xml version="1.0" encoding="utf-8"?>
+<p:sld xmlns:a="http://schemas.openxmlformats.org/drawingml/2006/main" xmlns:r="http://schemas.openxmlformats.org/officeDocument/2006/relationships" xmlns:p="http://schemas.openxmlformats.org/presentationml/2006/main">
+  <p:cSld>
+    <p:spTree>
+      <p:nvGrpSpPr>
+        <p:cNvPr id="1" name=""/>
+        <p:cNvGrpSpPr/>
+        <p:nvPr/>
+      </p:nvGrpSpPr>
+      <p:grpSpPr>
+        <a:xfrm>
+          <a:off x="0" y="0"/>
+          <a:ext cx="0" cy="0"/>
+          <a:chOff x="0" y="0"/>
+          <a:chExt cx="0" cy="0"/>
+        </a:xfrm>
+      </p:grpSpPr>
+      <p:sp>
+        <p:nvSpPr>
+          <p:cNvPr id="2" name="Title 1"/>
+          <p:cNvSpPr>
+            <a:spLocks noGrp="1"/>
+          </p:cNvSpPr>
+          <p:nvPr>
+            <p:ph type="title"/>
+          </p:nvPr>
+        </p:nvSpPr>
+        <p:spPr/>
+        <p:txBody>
+          <a:bodyPr/>
+          <a:lstStyle/>
+          <a:p>
+            <a:r>
+              <a:rPr lang="en-GB" dirty="0"/>
+              <a:t>Game Engine</a:t>
+            </a:r>
+          </a:p>
+        </p:txBody>
+      </p:sp>
+      <p:sp>
+        <p:nvSpPr>
+          <p:cNvPr id="3" name="Content Placeholder 2"/>
+          <p:cNvSpPr>
+            <a:spLocks noGrp="1"/>
+          </p:cNvSpPr>
+          <p:nvPr>
+            <p:ph idx="1"/>
+          </p:nvPr>
+        </p:nvSpPr>
+        <p:spPr/>
+        <p:txBody>
+          <a:bodyPr/>
+          <a:lstStyle/>
+          <a:p>
+            <a:endParaRPr lang="en-GB"/>
+          </a:p>
+        </p:txBody>
+      </p:sp>
+    </p:spTree>
+    <p:extLst>
+      <p:ext uri="{BB962C8B-B14F-4D97-AF65-F5344CB8AC3E}">
+        <p14:creationId xmlns:p14="http://schemas.microsoft.com/office/powerpoint/2010/main" val="3695787322"/>
+      </p:ext>
+    </p:extLst>
+  </p:cSld>
+  <p:clrMapOvr>
+    <a:masterClrMapping/>
+  </p:clrMapOvr>
+</p:sld>
+</file>
+
+<file path=ppt/slides/slide12.xml><?xml version="1.0" encoding="utf-8"?>
+<p:sld xmlns:a="http://schemas.openxmlformats.org/drawingml/2006/main" xmlns:r="http://schemas.openxmlformats.org/officeDocument/2006/relationships" xmlns:p="http://schemas.openxmlformats.org/presentationml/2006/main">
+  <p:cSld>
+    <p:spTree>
+      <p:nvGrpSpPr>
+        <p:cNvPr id="1" name=""/>
+        <p:cNvGrpSpPr/>
+        <p:nvPr/>
+      </p:nvGrpSpPr>
+      <p:grpSpPr>
+        <a:xfrm>
+          <a:off x="0" y="0"/>
+          <a:ext cx="0" cy="0"/>
+          <a:chOff x="0" y="0"/>
+          <a:chExt cx="0" cy="0"/>
+        </a:xfrm>
+      </p:grpSpPr>
+      <p:sp>
+        <p:nvSpPr>
+          <p:cNvPr id="2" name="Title 1"/>
+          <p:cNvSpPr>
+            <a:spLocks noGrp="1"/>
+          </p:cNvSpPr>
+          <p:nvPr>
+            <p:ph type="title"/>
+          </p:nvPr>
+        </p:nvSpPr>
+        <p:spPr/>
+        <p:txBody>
+          <a:bodyPr/>
+          <a:lstStyle/>
+          <a:p>
+            <a:endParaRPr lang="en-GB"/>
+          </a:p>
+        </p:txBody>
+      </p:sp>
+      <p:sp>
+        <p:nvSpPr>
+          <p:cNvPr id="3" name="Content Placeholder 2"/>
+          <p:cNvSpPr>
+            <a:spLocks noGrp="1"/>
+          </p:cNvSpPr>
+          <p:nvPr>
+            <p:ph idx="1"/>
+          </p:nvPr>
+        </p:nvSpPr>
+        <p:spPr/>
+        <p:txBody>
+          <a:bodyPr/>
+          <a:lstStyle/>
+          <a:p>
+            <a:endParaRPr lang="en-GB"/>
+          </a:p>
+        </p:txBody>
+      </p:sp>
+    </p:spTree>
+    <p:extLst>
+      <p:ext uri="{BB962C8B-B14F-4D97-AF65-F5344CB8AC3E}">
+        <p14:creationId xmlns:p14="http://schemas.microsoft.com/office/powerpoint/2010/main" val="256884393"/>
+      </p:ext>
+    </p:extLst>
+  </p:cSld>
+  <p:clrMapOvr>
+    <a:masterClrMapping/>
+  </p:clrMapOvr>
+</p:sld>
+</file>
+
 <file path=ppt/slides/slide2.xml><?xml version="1.0" encoding="utf-8"?>
 <p:sld xmlns:a="http://schemas.openxmlformats.org/drawingml/2006/main" xmlns:r="http://schemas.openxmlformats.org/officeDocument/2006/relationships" xmlns:p="http://schemas.openxmlformats.org/presentationml/2006/main">
   <p:cSld>
@@ -12667,7 +12885,7 @@
           <a:p>
             <a:r>
               <a:rPr lang="en-GB" dirty="0"/>
-              <a:t>Voice for Display</a:t>
+              <a:t>About Alexa</a:t>
             </a:r>
           </a:p>
         </p:txBody>
@@ -12694,7 +12912,7 @@
     </p:spTree>
     <p:extLst>
       <p:ext uri="{BB962C8B-B14F-4D97-AF65-F5344CB8AC3E}">
-        <p14:creationId xmlns:p14="http://schemas.microsoft.com/office/powerpoint/2010/main" val="4085098041"/>
+        <p14:creationId xmlns:p14="http://schemas.microsoft.com/office/powerpoint/2010/main" val="2524549692"/>
       </p:ext>
     </p:extLst>
   </p:cSld>
@@ -12733,13 +12951,15 @@
         </p:nvSpPr>
         <p:spPr/>
         <p:txBody>
-          <a:bodyPr/>
+          <a:bodyPr>
+            <a:normAutofit/>
+          </a:bodyPr>
           <a:lstStyle/>
           <a:p>
-            <a:r>
+            <a:br>
               <a:rPr lang="en-GB" dirty="0"/>
-              <a:t>Push Notifications</a:t>
-            </a:r>
+            </a:br>
+            <a:endParaRPr lang="en-GB" dirty="0"/>
           </a:p>
         </p:txBody>
       </p:sp>
@@ -12758,14 +12978,77 @@
           <a:bodyPr/>
           <a:lstStyle/>
           <a:p>
-            <a:endParaRPr lang="en-GB"/>
+            <a:pPr marL="0" indent="0">
+              <a:buNone/>
+            </a:pPr>
+            <a:br>
+              <a:rPr lang="en-GB" dirty="0"/>
+            </a:br>
+            <a:endParaRPr lang="en-GB" dirty="0"/>
+          </a:p>
+          <a:p>
+            <a:endParaRPr lang="en-GB" dirty="0"/>
+          </a:p>
+        </p:txBody>
+      </p:sp>
+      <p:sp>
+        <p:nvSpPr>
+          <p:cNvPr id="4" name="Title 1">
+            <a:extLst>
+              <a:ext uri="{FF2B5EF4-FFF2-40B4-BE49-F238E27FC236}">
+                <a16:creationId xmlns:a16="http://schemas.microsoft.com/office/drawing/2014/main" id="{DD21B757-F006-CD43-A6B7-606958BEDF0C}"/>
+              </a:ext>
+            </a:extLst>
+          </p:cNvPr>
+          <p:cNvSpPr txBox="1">
+            <a:spLocks/>
+          </p:cNvSpPr>
+          <p:nvPr/>
+        </p:nvSpPr>
+        <p:spPr>
+          <a:xfrm>
+            <a:off x="1141413" y="618518"/>
+            <a:ext cx="9905998" cy="1478570"/>
+          </a:xfrm>
+          <a:prstGeom prst="rect">
+            <a:avLst/>
+          </a:prstGeom>
+        </p:spPr>
+        <p:txBody>
+          <a:bodyPr vert="horz" lIns="91440" tIns="45720" rIns="91440" bIns="45720" rtlCol="0" anchor="ctr">
+            <a:normAutofit/>
+          </a:bodyPr>
+          <a:lstStyle>
+            <a:lvl1pPr algn="l" defTabSz="914400" rtl="0" eaLnBrk="1" latinLnBrk="0" hangingPunct="1">
+              <a:lnSpc>
+                <a:spcPct val="90000"/>
+              </a:lnSpc>
+              <a:spcBef>
+                <a:spcPct val="0"/>
+              </a:spcBef>
+              <a:buNone/>
+              <a:defRPr sz="3600" kern="1200" cap="all" baseline="0">
+                <a:solidFill>
+                  <a:schemeClr val="tx1"/>
+                </a:solidFill>
+                <a:latin typeface="+mj-lt"/>
+                <a:ea typeface="+mj-ea"/>
+                <a:cs typeface="+mj-cs"/>
+              </a:defRPr>
+            </a:lvl1pPr>
+          </a:lstStyle>
+          <a:p>
+            <a:r>
+              <a:rPr lang="en-GB" dirty="0"/>
+              <a:t>Request Lifecycle</a:t>
+            </a:r>
           </a:p>
         </p:txBody>
       </p:sp>
     </p:spTree>
     <p:extLst>
       <p:ext uri="{BB962C8B-B14F-4D97-AF65-F5344CB8AC3E}">
-        <p14:creationId xmlns:p14="http://schemas.microsoft.com/office/powerpoint/2010/main" val="2247287629"/>
+        <p14:creationId xmlns:p14="http://schemas.microsoft.com/office/powerpoint/2010/main" val="77956997"/>
       </p:ext>
     </p:extLst>
   </p:cSld>
@@ -12794,7 +13077,13 @@
       </p:grpSpPr>
       <p:sp>
         <p:nvSpPr>
-          <p:cNvPr id="2" name="Title 1"/>
+          <p:cNvPr id="2" name="Title 1">
+            <a:extLst>
+              <a:ext uri="{FF2B5EF4-FFF2-40B4-BE49-F238E27FC236}">
+                <a16:creationId xmlns:a16="http://schemas.microsoft.com/office/drawing/2014/main" id="{CE2DCE99-3065-2C46-B077-9F8544390E68}"/>
+              </a:ext>
+            </a:extLst>
+          </p:cNvPr>
           <p:cNvSpPr>
             <a:spLocks noGrp="1"/>
           </p:cNvSpPr>
@@ -12808,15 +13097,26 @@
           <a:lstStyle/>
           <a:p>
             <a:r>
-              <a:rPr lang="en-GB" dirty="0"/>
-              <a:t>Skill Messaging</a:t>
+              <a:rPr lang="en-US" dirty="0"/>
+              <a:t>The Contract: Boring </a:t>
             </a:r>
+            <a:r>
+              <a:rPr lang="en-US" dirty="0" err="1"/>
+              <a:t>Inc</a:t>
+            </a:r>
+            <a:endParaRPr lang="en-US" dirty="0"/>
           </a:p>
         </p:txBody>
       </p:sp>
       <p:sp>
         <p:nvSpPr>
-          <p:cNvPr id="3" name="Content Placeholder 2"/>
+          <p:cNvPr id="3" name="Content Placeholder 2">
+            <a:extLst>
+              <a:ext uri="{FF2B5EF4-FFF2-40B4-BE49-F238E27FC236}">
+                <a16:creationId xmlns:a16="http://schemas.microsoft.com/office/drawing/2014/main" id="{02FBC549-5B09-D24B-A898-39882C985AC0}"/>
+              </a:ext>
+            </a:extLst>
+          </p:cNvPr>
           <p:cNvSpPr>
             <a:spLocks noGrp="1"/>
           </p:cNvSpPr>
@@ -12829,14 +13129,14 @@
           <a:bodyPr/>
           <a:lstStyle/>
           <a:p>
-            <a:endParaRPr lang="en-GB"/>
+            <a:endParaRPr lang="en-US"/>
           </a:p>
         </p:txBody>
       </p:sp>
     </p:spTree>
     <p:extLst>
       <p:ext uri="{BB962C8B-B14F-4D97-AF65-F5344CB8AC3E}">
-        <p14:creationId xmlns:p14="http://schemas.microsoft.com/office/powerpoint/2010/main" val="4232488515"/>
+        <p14:creationId xmlns:p14="http://schemas.microsoft.com/office/powerpoint/2010/main" val="1843608740"/>
       </p:ext>
     </p:extLst>
   </p:cSld>
@@ -12875,13 +13175,15 @@
         </p:nvSpPr>
         <p:spPr/>
         <p:txBody>
-          <a:bodyPr/>
+          <a:bodyPr>
+            <a:normAutofit/>
+          </a:bodyPr>
           <a:lstStyle/>
           <a:p>
-            <a:r>
+            <a:br>
               <a:rPr lang="en-GB" dirty="0"/>
-              <a:t>Gadgets</a:t>
-            </a:r>
+            </a:br>
+            <a:endParaRPr lang="en-GB" dirty="0"/>
           </a:p>
         </p:txBody>
       </p:sp>
@@ -12900,14 +13202,77 @@
           <a:bodyPr/>
           <a:lstStyle/>
           <a:p>
-            <a:endParaRPr lang="en-GB"/>
+            <a:pPr marL="0" indent="0">
+              <a:buNone/>
+            </a:pPr>
+            <a:br>
+              <a:rPr lang="en-GB" dirty="0"/>
+            </a:br>
+            <a:endParaRPr lang="en-GB" dirty="0"/>
+          </a:p>
+          <a:p>
+            <a:endParaRPr lang="en-GB" dirty="0"/>
+          </a:p>
+        </p:txBody>
+      </p:sp>
+      <p:sp>
+        <p:nvSpPr>
+          <p:cNvPr id="4" name="Title 1">
+            <a:extLst>
+              <a:ext uri="{FF2B5EF4-FFF2-40B4-BE49-F238E27FC236}">
+                <a16:creationId xmlns:a16="http://schemas.microsoft.com/office/drawing/2014/main" id="{DD21B757-F006-CD43-A6B7-606958BEDF0C}"/>
+              </a:ext>
+            </a:extLst>
+          </p:cNvPr>
+          <p:cNvSpPr txBox="1">
+            <a:spLocks/>
+          </p:cNvSpPr>
+          <p:nvPr/>
+        </p:nvSpPr>
+        <p:spPr>
+          <a:xfrm>
+            <a:off x="1141413" y="618518"/>
+            <a:ext cx="9905998" cy="1478570"/>
+          </a:xfrm>
+          <a:prstGeom prst="rect">
+            <a:avLst/>
+          </a:prstGeom>
+        </p:spPr>
+        <p:txBody>
+          <a:bodyPr vert="horz" lIns="91440" tIns="45720" rIns="91440" bIns="45720" rtlCol="0" anchor="ctr">
+            <a:normAutofit/>
+          </a:bodyPr>
+          <a:lstStyle>
+            <a:lvl1pPr algn="l" defTabSz="914400" rtl="0" eaLnBrk="1" latinLnBrk="0" hangingPunct="1">
+              <a:lnSpc>
+                <a:spcPct val="90000"/>
+              </a:lnSpc>
+              <a:spcBef>
+                <a:spcPct val="0"/>
+              </a:spcBef>
+              <a:buNone/>
+              <a:defRPr sz="3600" kern="1200" cap="all" baseline="0">
+                <a:solidFill>
+                  <a:schemeClr val="tx1"/>
+                </a:solidFill>
+                <a:latin typeface="+mj-lt"/>
+                <a:ea typeface="+mj-ea"/>
+                <a:cs typeface="+mj-cs"/>
+              </a:defRPr>
+            </a:lvl1pPr>
+          </a:lstStyle>
+          <a:p>
+            <a:r>
+              <a:rPr lang="en-GB" dirty="0"/>
+              <a:t>Expressive Response</a:t>
+            </a:r>
           </a:p>
         </p:txBody>
       </p:sp>
     </p:spTree>
     <p:extLst>
       <p:ext uri="{BB962C8B-B14F-4D97-AF65-F5344CB8AC3E}">
-        <p14:creationId xmlns:p14="http://schemas.microsoft.com/office/powerpoint/2010/main" val="3777380794"/>
+        <p14:creationId xmlns:p14="http://schemas.microsoft.com/office/powerpoint/2010/main" val="2782864838"/>
       </p:ext>
     </p:extLst>
   </p:cSld>
@@ -12951,7 +13316,7 @@
           <a:p>
             <a:r>
               <a:rPr lang="en-GB" dirty="0"/>
-              <a:t>Gadget Controller</a:t>
+              <a:t>Push Notifications</a:t>
             </a:r>
           </a:p>
         </p:txBody>
@@ -12978,7 +13343,7 @@
     </p:spTree>
     <p:extLst>
       <p:ext uri="{BB962C8B-B14F-4D97-AF65-F5344CB8AC3E}">
-        <p14:creationId xmlns:p14="http://schemas.microsoft.com/office/powerpoint/2010/main" val="2066721731"/>
+        <p14:creationId xmlns:p14="http://schemas.microsoft.com/office/powerpoint/2010/main" val="2247287629"/>
       </p:ext>
     </p:extLst>
   </p:cSld>
@@ -13022,7 +13387,7 @@
           <a:p>
             <a:r>
               <a:rPr lang="en-GB" dirty="0"/>
-              <a:t>Game Engine</a:t>
+              <a:t>Skill Messaging</a:t>
             </a:r>
           </a:p>
         </p:txBody>
@@ -13049,7 +13414,7 @@
     </p:spTree>
     <p:extLst>
       <p:ext uri="{BB962C8B-B14F-4D97-AF65-F5344CB8AC3E}">
-        <p14:creationId xmlns:p14="http://schemas.microsoft.com/office/powerpoint/2010/main" val="3695787322"/>
+        <p14:creationId xmlns:p14="http://schemas.microsoft.com/office/powerpoint/2010/main" val="4232488515"/>
       </p:ext>
     </p:extLst>
   </p:cSld>
@@ -13091,7 +13456,10 @@
           <a:bodyPr/>
           <a:lstStyle/>
           <a:p>
-            <a:endParaRPr lang="en-GB"/>
+            <a:r>
+              <a:rPr lang="en-GB" dirty="0"/>
+              <a:t>Gadgets</a:t>
+            </a:r>
           </a:p>
         </p:txBody>
       </p:sp>
@@ -13117,7 +13485,7 @@
     </p:spTree>
     <p:extLst>
       <p:ext uri="{BB962C8B-B14F-4D97-AF65-F5344CB8AC3E}">
-        <p14:creationId xmlns:p14="http://schemas.microsoft.com/office/powerpoint/2010/main" val="256884393"/>
+        <p14:creationId xmlns:p14="http://schemas.microsoft.com/office/powerpoint/2010/main" val="3777380794"/>
       </p:ext>
     </p:extLst>
   </p:cSld>

</xml_diff>

<commit_message>
Add gadget diagrams and slides
</commit_message>
<xml_diff>
--- a/Presentation/VoiceAndMore.pptx
+++ b/Presentation/VoiceAndMore.pptx
@@ -5,7 +5,7 @@
     <p:sldMasterId id="2147483723" r:id="rId1"/>
   </p:sldMasterIdLst>
   <p:notesMasterIdLst>
-    <p:notesMasterId r:id="rId32"/>
+    <p:notesMasterId r:id="rId33"/>
   </p:notesMasterIdLst>
   <p:sldIdLst>
     <p:sldId id="256" r:id="rId2"/>
@@ -32,12 +32,13 @@
     <p:sldId id="288" r:id="rId23"/>
     <p:sldId id="263" r:id="rId24"/>
     <p:sldId id="286" r:id="rId25"/>
-    <p:sldId id="258" r:id="rId26"/>
-    <p:sldId id="289" r:id="rId27"/>
-    <p:sldId id="259" r:id="rId28"/>
-    <p:sldId id="260" r:id="rId29"/>
-    <p:sldId id="261" r:id="rId30"/>
-    <p:sldId id="262" r:id="rId31"/>
+    <p:sldId id="289" r:id="rId26"/>
+    <p:sldId id="259" r:id="rId27"/>
+    <p:sldId id="260" r:id="rId28"/>
+    <p:sldId id="261" r:id="rId29"/>
+    <p:sldId id="291" r:id="rId30"/>
+    <p:sldId id="290" r:id="rId31"/>
+    <p:sldId id="262" r:id="rId32"/>
   </p:sldIdLst>
   <p:sldSz cx="12192000" cy="6858000"/>
   <p:notesSz cx="6858000" cy="9144000"/>
@@ -1818,7 +1819,7 @@
           <a:p>
             <a:fld id="{89086A25-1D2B-4C4F-AF82-CC73108F7901}" type="slidenum">
               <a:rPr lang="en-US" smtClean="0"/>
-              <a:t>26</a:t>
+              <a:t>25</a:t>
             </a:fld>
             <a:endParaRPr lang="en-US"/>
           </a:p>
@@ -1902,7 +1903,7 @@
           <a:p>
             <a:fld id="{89086A25-1D2B-4C4F-AF82-CC73108F7901}" type="slidenum">
               <a:rPr lang="en-US" smtClean="0"/>
-              <a:t>27</a:t>
+              <a:t>26</a:t>
             </a:fld>
             <a:endParaRPr lang="en-US"/>
           </a:p>
@@ -14800,7 +14801,7 @@
           <a:p>
             <a:r>
               <a:rPr lang="en-GB" dirty="0"/>
-              <a:t>Skill Messaging</a:t>
+              <a:t>Push Notification - Messages</a:t>
             </a:r>
           </a:p>
         </p:txBody>
@@ -15098,7 +15099,7 @@
           <a:p>
             <a:r>
               <a:rPr lang="en-GB" dirty="0"/>
-              <a:t>Skill Messaging</a:t>
+              <a:t>Push Notifications</a:t>
             </a:r>
           </a:p>
         </p:txBody>
@@ -18350,7 +18351,13 @@
       </p:grpSpPr>
       <p:sp>
         <p:nvSpPr>
-          <p:cNvPr id="2" name="Title 1"/>
+          <p:cNvPr id="2" name="Title 1">
+            <a:extLst>
+              <a:ext uri="{FF2B5EF4-FFF2-40B4-BE49-F238E27FC236}">
+                <a16:creationId xmlns:a16="http://schemas.microsoft.com/office/drawing/2014/main" id="{3927750E-CF28-4B48-A10B-BC02EB9CD0FA}"/>
+              </a:ext>
+            </a:extLst>
+          </p:cNvPr>
           <p:cNvSpPr>
             <a:spLocks noGrp="1"/>
           </p:cNvSpPr>
@@ -18364,15 +18371,22 @@
           <a:lstStyle/>
           <a:p>
             <a:r>
-              <a:rPr lang="en-GB" dirty="0"/>
-              <a:t>Push Notifications</a:t>
-            </a:r>
+              <a:rPr lang="en-US" dirty="0"/>
+              <a:t>Demo 5</a:t>
+            </a:r>
+            <a:endParaRPr lang="en-GB" dirty="0"/>
           </a:p>
         </p:txBody>
       </p:sp>
       <p:sp>
         <p:nvSpPr>
-          <p:cNvPr id="3" name="Content Placeholder 2"/>
+          <p:cNvPr id="3" name="Content Placeholder 2">
+            <a:extLst>
+              <a:ext uri="{FF2B5EF4-FFF2-40B4-BE49-F238E27FC236}">
+                <a16:creationId xmlns:a16="http://schemas.microsoft.com/office/drawing/2014/main" id="{F82C128F-C733-41C5-BA02-69C5A8077248}"/>
+              </a:ext>
+            </a:extLst>
+          </p:cNvPr>
           <p:cNvSpPr>
             <a:spLocks noGrp="1"/>
           </p:cNvSpPr>
@@ -18385,14 +18399,23 @@
           <a:bodyPr/>
           <a:lstStyle/>
           <a:p>
-            <a:endParaRPr lang="en-GB"/>
+            <a:r>
+              <a:rPr lang="en-GB" dirty="0"/>
+              <a:t>Skill Messaging</a:t>
+            </a:r>
+          </a:p>
+          <a:p>
+            <a:r>
+              <a:rPr lang="en-GB" dirty="0"/>
+              <a:t>Push Notifications</a:t>
+            </a:r>
           </a:p>
         </p:txBody>
       </p:sp>
     </p:spTree>
     <p:extLst>
       <p:ext uri="{BB962C8B-B14F-4D97-AF65-F5344CB8AC3E}">
-        <p14:creationId xmlns:p14="http://schemas.microsoft.com/office/powerpoint/2010/main" val="2247287629"/>
+        <p14:creationId xmlns:p14="http://schemas.microsoft.com/office/powerpoint/2010/main" val="1650790312"/>
       </p:ext>
     </p:extLst>
   </p:cSld>
@@ -18421,13 +18444,7 @@
       </p:grpSpPr>
       <p:sp>
         <p:nvSpPr>
-          <p:cNvPr id="2" name="Title 1">
-            <a:extLst>
-              <a:ext uri="{FF2B5EF4-FFF2-40B4-BE49-F238E27FC236}">
-                <a16:creationId xmlns:a16="http://schemas.microsoft.com/office/drawing/2014/main" id="{3927750E-CF28-4B48-A10B-BC02EB9CD0FA}"/>
-              </a:ext>
-            </a:extLst>
-          </p:cNvPr>
+          <p:cNvPr id="2" name="Title 1"/>
           <p:cNvSpPr>
             <a:spLocks noGrp="1"/>
           </p:cNvSpPr>
@@ -18441,22 +18458,15 @@
           <a:lstStyle/>
           <a:p>
             <a:r>
-              <a:rPr lang="en-US" dirty="0"/>
-              <a:t>Demo 4</a:t>
-            </a:r>
-            <a:endParaRPr lang="en-GB" dirty="0"/>
+              <a:rPr lang="en-GB" dirty="0"/>
+              <a:t>Gadgets</a:t>
+            </a:r>
           </a:p>
         </p:txBody>
       </p:sp>
       <p:sp>
         <p:nvSpPr>
-          <p:cNvPr id="3" name="Content Placeholder 2">
-            <a:extLst>
-              <a:ext uri="{FF2B5EF4-FFF2-40B4-BE49-F238E27FC236}">
-                <a16:creationId xmlns:a16="http://schemas.microsoft.com/office/drawing/2014/main" id="{F82C128F-C733-41C5-BA02-69C5A8077248}"/>
-              </a:ext>
-            </a:extLst>
-          </p:cNvPr>
+          <p:cNvPr id="3" name="Content Placeholder 2"/>
           <p:cNvSpPr>
             <a:spLocks noGrp="1"/>
           </p:cNvSpPr>
@@ -18469,23 +18479,44 @@
           <a:bodyPr/>
           <a:lstStyle/>
           <a:p>
-            <a:r>
-              <a:rPr lang="en-GB" dirty="0"/>
-              <a:t>SSML</a:t>
-            </a:r>
-          </a:p>
-          <a:p>
-            <a:r>
-              <a:rPr lang="en-GB" dirty="0"/>
-              <a:t>Alexa Sound Library</a:t>
-            </a:r>
+            <a:endParaRPr lang="en-GB"/>
           </a:p>
         </p:txBody>
       </p:sp>
+      <p:pic>
+        <p:nvPicPr>
+          <p:cNvPr id="4" name="Picture 3">
+            <a:extLst>
+              <a:ext uri="{FF2B5EF4-FFF2-40B4-BE49-F238E27FC236}">
+                <a16:creationId xmlns:a16="http://schemas.microsoft.com/office/drawing/2014/main" id="{468575FC-6DBC-3340-9B08-55A1A15D1501}"/>
+              </a:ext>
+            </a:extLst>
+          </p:cNvPr>
+          <p:cNvPicPr>
+            <a:picLocks noChangeAspect="1"/>
+          </p:cNvPicPr>
+          <p:nvPr/>
+        </p:nvPicPr>
+        <p:blipFill>
+          <a:blip r:embed="rId3"/>
+          <a:stretch>
+            <a:fillRect/>
+          </a:stretch>
+        </p:blipFill>
+        <p:spPr>
+          <a:xfrm>
+            <a:off x="2902613" y="1888914"/>
+            <a:ext cx="6223000" cy="3937000"/>
+          </a:xfrm>
+          <a:prstGeom prst="rect">
+            <a:avLst/>
+          </a:prstGeom>
+        </p:spPr>
+      </p:pic>
     </p:spTree>
     <p:extLst>
       <p:ext uri="{BB962C8B-B14F-4D97-AF65-F5344CB8AC3E}">
-        <p14:creationId xmlns:p14="http://schemas.microsoft.com/office/powerpoint/2010/main" val="1650790312"/>
+        <p14:creationId xmlns:p14="http://schemas.microsoft.com/office/powerpoint/2010/main" val="3777380794"/>
       </p:ext>
     </p:extLst>
   </p:cSld>
@@ -18529,7 +18560,7 @@
           <a:p>
             <a:r>
               <a:rPr lang="en-GB" dirty="0"/>
-              <a:t>Gadgets</a:t>
+              <a:t>Gadget Controller</a:t>
             </a:r>
           </a:p>
         </p:txBody>
@@ -18549,14 +18580,51 @@
           <a:bodyPr/>
           <a:lstStyle/>
           <a:p>
-            <a:endParaRPr lang="en-GB"/>
+            <a:pPr marL="0" indent="0">
+              <a:buNone/>
+            </a:pPr>
+            <a:r>
+              <a:rPr lang="en-GB" dirty="0"/>
+              <a:t>  </a:t>
+            </a:r>
+            <a:r>
+              <a:rPr lang="en-GB" dirty="0" err="1"/>
+              <a:t>SetLight</a:t>
+            </a:r>
+            <a:r>
+              <a:rPr lang="en-GB" dirty="0"/>
+              <a:t> Directive</a:t>
+            </a:r>
+          </a:p>
+          <a:p>
+            <a:r>
+              <a:rPr lang="en-GB" dirty="0"/>
+              <a:t>Each </a:t>
+            </a:r>
+            <a:r>
+              <a:rPr lang="en-GB" dirty="0" err="1"/>
+              <a:t>color</a:t>
+            </a:r>
+            <a:r>
+              <a:rPr lang="en-GB" dirty="0"/>
+              <a:t> change is a step in an animation</a:t>
+            </a:r>
+          </a:p>
+          <a:p>
+            <a:r>
+              <a:rPr lang="en-GB" dirty="0"/>
+              <a:t>Can be triggered or starts straight away</a:t>
+            </a:r>
+          </a:p>
+          <a:p>
+            <a:endParaRPr lang="en-GB" dirty="0"/>
           </a:p>
         </p:txBody>
       </p:sp>
     </p:spTree>
     <p:extLst>
       <p:ext uri="{BB962C8B-B14F-4D97-AF65-F5344CB8AC3E}">
-        <p14:creationId xmlns:p14="http://schemas.microsoft.com/office/powerpoint/2010/main" val="3777380794"/>
+        <p14:creationId xmlns:p14="http://schemas.microsoft.com/office/powerpoint/2010/main" val="2066721731"/>
       </p:ext>
     </p:extLst>
   </p:cSld>
@@ -18600,7 +18668,7 @@
           <a:p>
             <a:r>
               <a:rPr lang="en-GB" dirty="0"/>
-              <a:t>Gadget Controller</a:t>
+              <a:t>Game Engine</a:t>
             </a:r>
           </a:p>
         </p:txBody>
@@ -18620,14 +18688,33 @@
           <a:bodyPr/>
           <a:lstStyle/>
           <a:p>
-            <a:endParaRPr lang="en-GB"/>
+            <a:r>
+              <a:rPr lang="en-GB" dirty="0" err="1"/>
+              <a:t>StartInputHandler</a:t>
+            </a:r>
+            <a:endParaRPr lang="en-GB" dirty="0"/>
+          </a:p>
+          <a:p>
+            <a:r>
+              <a:rPr lang="en-GB" dirty="0"/>
+              <a:t>Recognisers – What to monitor</a:t>
+            </a:r>
+          </a:p>
+          <a:p>
+            <a:r>
+              <a:rPr lang="en-GB" dirty="0"/>
+              <a:t>Events – When to tell you about it</a:t>
+            </a:r>
+          </a:p>
+          <a:p>
+            <a:endParaRPr lang="en-GB" dirty="0"/>
           </a:p>
         </p:txBody>
       </p:sp>
     </p:spTree>
     <p:extLst>
       <p:ext uri="{BB962C8B-B14F-4D97-AF65-F5344CB8AC3E}">
-        <p14:creationId xmlns:p14="http://schemas.microsoft.com/office/powerpoint/2010/main" val="2066721731"/>
+        <p14:creationId xmlns:p14="http://schemas.microsoft.com/office/powerpoint/2010/main" val="3695787322"/>
       </p:ext>
     </p:extLst>
   </p:cSld>
@@ -18691,20 +18778,1707 @@
           <a:bodyPr/>
           <a:lstStyle/>
           <a:p>
-            <a:endParaRPr lang="en-GB"/>
+            <a:endParaRPr lang="en-GB" dirty="0"/>
+          </a:p>
+        </p:txBody>
+      </p:sp>
+      <p:cxnSp>
+        <p:nvCxnSpPr>
+          <p:cNvPr id="5" name="Straight Connector 4">
+            <a:extLst>
+              <a:ext uri="{FF2B5EF4-FFF2-40B4-BE49-F238E27FC236}">
+                <a16:creationId xmlns:a16="http://schemas.microsoft.com/office/drawing/2014/main" id="{A85CDF38-4E27-FD45-B125-371249EE7AE4}"/>
+              </a:ext>
+            </a:extLst>
+          </p:cNvPr>
+          <p:cNvCxnSpPr/>
+          <p:nvPr/>
+        </p:nvCxnSpPr>
+        <p:spPr>
+          <a:xfrm>
+            <a:off x="1269242" y="2006221"/>
+            <a:ext cx="9886438" cy="0"/>
+          </a:xfrm>
+          <a:prstGeom prst="line">
+            <a:avLst/>
+          </a:prstGeom>
+        </p:spPr>
+        <p:style>
+          <a:lnRef idx="1">
+            <a:schemeClr val="accent1"/>
+          </a:lnRef>
+          <a:fillRef idx="0">
+            <a:schemeClr val="accent1"/>
+          </a:fillRef>
+          <a:effectRef idx="0">
+            <a:schemeClr val="accent1"/>
+          </a:effectRef>
+          <a:fontRef idx="minor">
+            <a:schemeClr val="tx1"/>
+          </a:fontRef>
+        </p:style>
+      </p:cxnSp>
+      <p:sp>
+        <p:nvSpPr>
+          <p:cNvPr id="6" name="TextBox 5">
+            <a:extLst>
+              <a:ext uri="{FF2B5EF4-FFF2-40B4-BE49-F238E27FC236}">
+                <a16:creationId xmlns:a16="http://schemas.microsoft.com/office/drawing/2014/main" id="{E8A589F5-F7F7-FF48-83D8-65F84FED83BA}"/>
+              </a:ext>
+            </a:extLst>
+          </p:cNvPr>
+          <p:cNvSpPr txBox="1"/>
+          <p:nvPr/>
+        </p:nvSpPr>
+        <p:spPr>
+          <a:xfrm>
+            <a:off x="11155680" y="1859382"/>
+            <a:ext cx="508473" cy="369332"/>
+          </a:xfrm>
+          <a:prstGeom prst="rect">
+            <a:avLst/>
+          </a:prstGeom>
+          <a:noFill/>
+        </p:spPr>
+        <p:txBody>
+          <a:bodyPr wrap="none" rtlCol="0">
+            <a:spAutoFit/>
+          </a:bodyPr>
+          <a:lstStyle/>
+          <a:p>
+            <a:r>
+              <a:rPr lang="en-US" dirty="0"/>
+              <a:t>10s</a:t>
+            </a:r>
+          </a:p>
+        </p:txBody>
+      </p:sp>
+      <p:sp>
+        <p:nvSpPr>
+          <p:cNvPr id="7" name="TextBox 6">
+            <a:extLst>
+              <a:ext uri="{FF2B5EF4-FFF2-40B4-BE49-F238E27FC236}">
+                <a16:creationId xmlns:a16="http://schemas.microsoft.com/office/drawing/2014/main" id="{4D6266BA-6812-654A-B558-E9C028DA4608}"/>
+              </a:ext>
+            </a:extLst>
+          </p:cNvPr>
+          <p:cNvSpPr txBox="1"/>
+          <p:nvPr/>
+        </p:nvSpPr>
+        <p:spPr>
+          <a:xfrm>
+            <a:off x="619845" y="1821555"/>
+            <a:ext cx="391454" cy="369332"/>
+          </a:xfrm>
+          <a:prstGeom prst="rect">
+            <a:avLst/>
+          </a:prstGeom>
+          <a:noFill/>
+        </p:spPr>
+        <p:txBody>
+          <a:bodyPr wrap="none" rtlCol="0">
+            <a:spAutoFit/>
+          </a:bodyPr>
+          <a:lstStyle/>
+          <a:p>
+            <a:r>
+              <a:rPr lang="en-US" dirty="0"/>
+              <a:t>0s</a:t>
+            </a:r>
+          </a:p>
+        </p:txBody>
+      </p:sp>
+      <p:sp>
+        <p:nvSpPr>
+          <p:cNvPr id="8" name="Oval 7">
+            <a:extLst>
+              <a:ext uri="{FF2B5EF4-FFF2-40B4-BE49-F238E27FC236}">
+                <a16:creationId xmlns:a16="http://schemas.microsoft.com/office/drawing/2014/main" id="{A0DEAC92-08E5-E14A-A0BA-EB250893B93A}"/>
+              </a:ext>
+            </a:extLst>
+          </p:cNvPr>
+          <p:cNvSpPr/>
+          <p:nvPr/>
+        </p:nvSpPr>
+        <p:spPr>
+          <a:xfrm>
+            <a:off x="1815152" y="2228714"/>
+            <a:ext cx="368490" cy="364361"/>
+          </a:xfrm>
+          <a:prstGeom prst="ellipse">
+            <a:avLst/>
+          </a:prstGeom>
+          <a:solidFill>
+            <a:srgbClr val="00B050"/>
+          </a:solidFill>
+        </p:spPr>
+        <p:style>
+          <a:lnRef idx="2">
+            <a:schemeClr val="accent1">
+              <a:shade val="50000"/>
+            </a:schemeClr>
+          </a:lnRef>
+          <a:fillRef idx="1">
+            <a:schemeClr val="accent1"/>
+          </a:fillRef>
+          <a:effectRef idx="0">
+            <a:schemeClr val="accent1"/>
+          </a:effectRef>
+          <a:fontRef idx="minor">
+            <a:schemeClr val="lt1"/>
+          </a:fontRef>
+        </p:style>
+        <p:txBody>
+          <a:bodyPr rtlCol="0" anchor="ctr"/>
+          <a:lstStyle/>
+          <a:p>
+            <a:pPr algn="ctr"/>
+            <a:endParaRPr lang="en-US"/>
+          </a:p>
+        </p:txBody>
+      </p:sp>
+      <p:sp>
+        <p:nvSpPr>
+          <p:cNvPr id="9" name="Oval 8">
+            <a:extLst>
+              <a:ext uri="{FF2B5EF4-FFF2-40B4-BE49-F238E27FC236}">
+                <a16:creationId xmlns:a16="http://schemas.microsoft.com/office/drawing/2014/main" id="{A539C99B-511B-E145-B021-A805A639528B}"/>
+              </a:ext>
+            </a:extLst>
+          </p:cNvPr>
+          <p:cNvSpPr/>
+          <p:nvPr/>
+        </p:nvSpPr>
+        <p:spPr>
+          <a:xfrm>
+            <a:off x="4437797" y="2228713"/>
+            <a:ext cx="368490" cy="364361"/>
+          </a:xfrm>
+          <a:prstGeom prst="ellipse">
+            <a:avLst/>
+          </a:prstGeom>
+          <a:solidFill>
+            <a:srgbClr val="0070C0"/>
+          </a:solidFill>
+        </p:spPr>
+        <p:style>
+          <a:lnRef idx="2">
+            <a:schemeClr val="accent1">
+              <a:shade val="50000"/>
+            </a:schemeClr>
+          </a:lnRef>
+          <a:fillRef idx="1">
+            <a:schemeClr val="accent1"/>
+          </a:fillRef>
+          <a:effectRef idx="0">
+            <a:schemeClr val="accent1"/>
+          </a:effectRef>
+          <a:fontRef idx="minor">
+            <a:schemeClr val="lt1"/>
+          </a:fontRef>
+        </p:style>
+        <p:txBody>
+          <a:bodyPr rtlCol="0" anchor="ctr"/>
+          <a:lstStyle/>
+          <a:p>
+            <a:pPr algn="ctr"/>
+            <a:endParaRPr lang="en-US"/>
+          </a:p>
+        </p:txBody>
+      </p:sp>
+      <p:sp>
+        <p:nvSpPr>
+          <p:cNvPr id="10" name="Oval 9">
+            <a:extLst>
+              <a:ext uri="{FF2B5EF4-FFF2-40B4-BE49-F238E27FC236}">
+                <a16:creationId xmlns:a16="http://schemas.microsoft.com/office/drawing/2014/main" id="{1652CAC3-0CD8-E047-B52B-106142A937CB}"/>
+              </a:ext>
+            </a:extLst>
+          </p:cNvPr>
+          <p:cNvSpPr/>
+          <p:nvPr/>
+        </p:nvSpPr>
+        <p:spPr>
+          <a:xfrm>
+            <a:off x="3250896" y="2228714"/>
+            <a:ext cx="368490" cy="364361"/>
+          </a:xfrm>
+          <a:prstGeom prst="ellipse">
+            <a:avLst/>
+          </a:prstGeom>
+          <a:solidFill>
+            <a:srgbClr val="FFFF00"/>
+          </a:solidFill>
+        </p:spPr>
+        <p:style>
+          <a:lnRef idx="2">
+            <a:schemeClr val="accent1">
+              <a:shade val="50000"/>
+            </a:schemeClr>
+          </a:lnRef>
+          <a:fillRef idx="1">
+            <a:schemeClr val="accent1"/>
+          </a:fillRef>
+          <a:effectRef idx="0">
+            <a:schemeClr val="accent1"/>
+          </a:effectRef>
+          <a:fontRef idx="minor">
+            <a:schemeClr val="lt1"/>
+          </a:fontRef>
+        </p:style>
+        <p:txBody>
+          <a:bodyPr rtlCol="0" anchor="ctr"/>
+          <a:lstStyle/>
+          <a:p>
+            <a:pPr algn="ctr"/>
+            <a:endParaRPr lang="en-US"/>
+          </a:p>
+        </p:txBody>
+      </p:sp>
+      <p:sp>
+        <p:nvSpPr>
+          <p:cNvPr id="11" name="Oval 10">
+            <a:extLst>
+              <a:ext uri="{FF2B5EF4-FFF2-40B4-BE49-F238E27FC236}">
+                <a16:creationId xmlns:a16="http://schemas.microsoft.com/office/drawing/2014/main" id="{4AE7F27F-CD37-DF49-81AF-4EE2BCD327B8}"/>
+              </a:ext>
+            </a:extLst>
+          </p:cNvPr>
+          <p:cNvSpPr/>
+          <p:nvPr/>
+        </p:nvSpPr>
+        <p:spPr>
+          <a:xfrm>
+            <a:off x="2717269" y="2228714"/>
+            <a:ext cx="368490" cy="364361"/>
+          </a:xfrm>
+          <a:prstGeom prst="ellipse">
+            <a:avLst/>
+          </a:prstGeom>
+          <a:solidFill>
+            <a:srgbClr val="FF0000"/>
+          </a:solidFill>
+        </p:spPr>
+        <p:style>
+          <a:lnRef idx="2">
+            <a:schemeClr val="accent1">
+              <a:shade val="50000"/>
+            </a:schemeClr>
+          </a:lnRef>
+          <a:fillRef idx="1">
+            <a:schemeClr val="accent1"/>
+          </a:fillRef>
+          <a:effectRef idx="0">
+            <a:schemeClr val="accent1"/>
+          </a:effectRef>
+          <a:fontRef idx="minor">
+            <a:schemeClr val="lt1"/>
+          </a:fontRef>
+        </p:style>
+        <p:txBody>
+          <a:bodyPr rtlCol="0" anchor="ctr"/>
+          <a:lstStyle/>
+          <a:p>
+            <a:pPr algn="ctr"/>
+            <a:endParaRPr lang="en-US"/>
+          </a:p>
+        </p:txBody>
+      </p:sp>
+      <p:sp>
+        <p:nvSpPr>
+          <p:cNvPr id="12" name="Oval 11">
+            <a:extLst>
+              <a:ext uri="{FF2B5EF4-FFF2-40B4-BE49-F238E27FC236}">
+                <a16:creationId xmlns:a16="http://schemas.microsoft.com/office/drawing/2014/main" id="{68A907DF-F6B8-8E49-B056-0D225683B1AA}"/>
+              </a:ext>
+            </a:extLst>
+          </p:cNvPr>
+          <p:cNvSpPr/>
+          <p:nvPr/>
+        </p:nvSpPr>
+        <p:spPr>
+          <a:xfrm>
+            <a:off x="7773765" y="2228712"/>
+            <a:ext cx="368490" cy="364361"/>
+          </a:xfrm>
+          <a:prstGeom prst="ellipse">
+            <a:avLst/>
+          </a:prstGeom>
+          <a:solidFill>
+            <a:srgbClr val="FFFF00"/>
+          </a:solidFill>
+        </p:spPr>
+        <p:style>
+          <a:lnRef idx="2">
+            <a:schemeClr val="accent1">
+              <a:shade val="50000"/>
+            </a:schemeClr>
+          </a:lnRef>
+          <a:fillRef idx="1">
+            <a:schemeClr val="accent1"/>
+          </a:fillRef>
+          <a:effectRef idx="0">
+            <a:schemeClr val="accent1"/>
+          </a:effectRef>
+          <a:fontRef idx="minor">
+            <a:schemeClr val="lt1"/>
+          </a:fontRef>
+        </p:style>
+        <p:txBody>
+          <a:bodyPr rtlCol="0" anchor="ctr"/>
+          <a:lstStyle/>
+          <a:p>
+            <a:pPr algn="ctr"/>
+            <a:endParaRPr lang="en-US"/>
+          </a:p>
+        </p:txBody>
+      </p:sp>
+      <p:sp>
+        <p:nvSpPr>
+          <p:cNvPr id="13" name="Oval 12">
+            <a:extLst>
+              <a:ext uri="{FF2B5EF4-FFF2-40B4-BE49-F238E27FC236}">
+                <a16:creationId xmlns:a16="http://schemas.microsoft.com/office/drawing/2014/main" id="{BB564FF0-DB62-B040-B252-F516998F7E64}"/>
+              </a:ext>
+            </a:extLst>
+          </p:cNvPr>
+          <p:cNvSpPr/>
+          <p:nvPr/>
+        </p:nvSpPr>
+        <p:spPr>
+          <a:xfrm>
+            <a:off x="7287222" y="2228713"/>
+            <a:ext cx="368490" cy="364361"/>
+          </a:xfrm>
+          <a:prstGeom prst="ellipse">
+            <a:avLst/>
+          </a:prstGeom>
+          <a:solidFill>
+            <a:srgbClr val="0070C0"/>
+          </a:solidFill>
+        </p:spPr>
+        <p:style>
+          <a:lnRef idx="2">
+            <a:schemeClr val="accent1">
+              <a:shade val="50000"/>
+            </a:schemeClr>
+          </a:lnRef>
+          <a:fillRef idx="1">
+            <a:schemeClr val="accent1"/>
+          </a:fillRef>
+          <a:effectRef idx="0">
+            <a:schemeClr val="accent1"/>
+          </a:effectRef>
+          <a:fontRef idx="minor">
+            <a:schemeClr val="lt1"/>
+          </a:fontRef>
+        </p:style>
+        <p:txBody>
+          <a:bodyPr rtlCol="0" anchor="ctr"/>
+          <a:lstStyle/>
+          <a:p>
+            <a:pPr algn="ctr"/>
+            <a:endParaRPr lang="en-US"/>
+          </a:p>
+        </p:txBody>
+      </p:sp>
+      <p:sp>
+        <p:nvSpPr>
+          <p:cNvPr id="14" name="Oval 13">
+            <a:extLst>
+              <a:ext uri="{FF2B5EF4-FFF2-40B4-BE49-F238E27FC236}">
+                <a16:creationId xmlns:a16="http://schemas.microsoft.com/office/drawing/2014/main" id="{9A7E70E7-2F21-044B-81C2-7A25D408977B}"/>
+              </a:ext>
+            </a:extLst>
+          </p:cNvPr>
+          <p:cNvSpPr/>
+          <p:nvPr/>
+        </p:nvSpPr>
+        <p:spPr>
+          <a:xfrm>
+            <a:off x="6188123" y="2233263"/>
+            <a:ext cx="368490" cy="364361"/>
+          </a:xfrm>
+          <a:prstGeom prst="ellipse">
+            <a:avLst/>
+          </a:prstGeom>
+          <a:solidFill>
+            <a:srgbClr val="FF0000"/>
+          </a:solidFill>
+        </p:spPr>
+        <p:style>
+          <a:lnRef idx="2">
+            <a:schemeClr val="accent1">
+              <a:shade val="50000"/>
+            </a:schemeClr>
+          </a:lnRef>
+          <a:fillRef idx="1">
+            <a:schemeClr val="accent1"/>
+          </a:fillRef>
+          <a:effectRef idx="0">
+            <a:schemeClr val="accent1"/>
+          </a:effectRef>
+          <a:fontRef idx="minor">
+            <a:schemeClr val="lt1"/>
+          </a:fontRef>
+        </p:style>
+        <p:txBody>
+          <a:bodyPr rtlCol="0" anchor="ctr"/>
+          <a:lstStyle/>
+          <a:p>
+            <a:pPr algn="ctr"/>
+            <a:endParaRPr lang="en-US"/>
+          </a:p>
+        </p:txBody>
+      </p:sp>
+      <p:sp>
+        <p:nvSpPr>
+          <p:cNvPr id="15" name="Oval 14">
+            <a:extLst>
+              <a:ext uri="{FF2B5EF4-FFF2-40B4-BE49-F238E27FC236}">
+                <a16:creationId xmlns:a16="http://schemas.microsoft.com/office/drawing/2014/main" id="{38608862-D6DF-E148-AD03-97C0976745CA}"/>
+              </a:ext>
+            </a:extLst>
+          </p:cNvPr>
+          <p:cNvSpPr/>
+          <p:nvPr/>
+        </p:nvSpPr>
+        <p:spPr>
+          <a:xfrm>
+            <a:off x="9882799" y="2228712"/>
+            <a:ext cx="368490" cy="364361"/>
+          </a:xfrm>
+          <a:prstGeom prst="ellipse">
+            <a:avLst/>
+          </a:prstGeom>
+          <a:solidFill>
+            <a:srgbClr val="FFFF00"/>
+          </a:solidFill>
+        </p:spPr>
+        <p:style>
+          <a:lnRef idx="2">
+            <a:schemeClr val="accent1">
+              <a:shade val="50000"/>
+            </a:schemeClr>
+          </a:lnRef>
+          <a:fillRef idx="1">
+            <a:schemeClr val="accent1"/>
+          </a:fillRef>
+          <a:effectRef idx="0">
+            <a:schemeClr val="accent1"/>
+          </a:effectRef>
+          <a:fontRef idx="minor">
+            <a:schemeClr val="lt1"/>
+          </a:fontRef>
+        </p:style>
+        <p:txBody>
+          <a:bodyPr rtlCol="0" anchor="ctr"/>
+          <a:lstStyle/>
+          <a:p>
+            <a:pPr algn="ctr"/>
+            <a:endParaRPr lang="en-US"/>
+          </a:p>
+        </p:txBody>
+      </p:sp>
+      <p:sp>
+        <p:nvSpPr>
+          <p:cNvPr id="16" name="Oval 15">
+            <a:extLst>
+              <a:ext uri="{FF2B5EF4-FFF2-40B4-BE49-F238E27FC236}">
+                <a16:creationId xmlns:a16="http://schemas.microsoft.com/office/drawing/2014/main" id="{FC3B0478-ED3D-1649-AE80-4C9026EB8AE0}"/>
+              </a:ext>
+            </a:extLst>
+          </p:cNvPr>
+          <p:cNvSpPr/>
+          <p:nvPr/>
+        </p:nvSpPr>
+        <p:spPr>
+          <a:xfrm>
+            <a:off x="9201548" y="2228712"/>
+            <a:ext cx="368490" cy="364361"/>
+          </a:xfrm>
+          <a:prstGeom prst="ellipse">
+            <a:avLst/>
+          </a:prstGeom>
+          <a:solidFill>
+            <a:srgbClr val="0070C0"/>
+          </a:solidFill>
+        </p:spPr>
+        <p:style>
+          <a:lnRef idx="2">
+            <a:schemeClr val="accent1">
+              <a:shade val="50000"/>
+            </a:schemeClr>
+          </a:lnRef>
+          <a:fillRef idx="1">
+            <a:schemeClr val="accent1"/>
+          </a:fillRef>
+          <a:effectRef idx="0">
+            <a:schemeClr val="accent1"/>
+          </a:effectRef>
+          <a:fontRef idx="minor">
+            <a:schemeClr val="lt1"/>
+          </a:fontRef>
+        </p:style>
+        <p:txBody>
+          <a:bodyPr rtlCol="0" anchor="ctr"/>
+          <a:lstStyle/>
+          <a:p>
+            <a:pPr algn="ctr"/>
+            <a:endParaRPr lang="en-US"/>
+          </a:p>
+        </p:txBody>
+      </p:sp>
+      <p:sp>
+        <p:nvSpPr>
+          <p:cNvPr id="17" name="Oval 16">
+            <a:extLst>
+              <a:ext uri="{FF2B5EF4-FFF2-40B4-BE49-F238E27FC236}">
+                <a16:creationId xmlns:a16="http://schemas.microsoft.com/office/drawing/2014/main" id="{A632503C-50F0-F141-A431-7C5D3B01F834}"/>
+              </a:ext>
+            </a:extLst>
+          </p:cNvPr>
+          <p:cNvSpPr/>
+          <p:nvPr/>
+        </p:nvSpPr>
+        <p:spPr>
+          <a:xfrm>
+            <a:off x="8292607" y="2228712"/>
+            <a:ext cx="368490" cy="364361"/>
+          </a:xfrm>
+          <a:prstGeom prst="ellipse">
+            <a:avLst/>
+          </a:prstGeom>
+          <a:solidFill>
+            <a:srgbClr val="FFFF00"/>
+          </a:solidFill>
+        </p:spPr>
+        <p:style>
+          <a:lnRef idx="2">
+            <a:schemeClr val="accent1">
+              <a:shade val="50000"/>
+            </a:schemeClr>
+          </a:lnRef>
+          <a:fillRef idx="1">
+            <a:schemeClr val="accent1"/>
+          </a:fillRef>
+          <a:effectRef idx="0">
+            <a:schemeClr val="accent1"/>
+          </a:effectRef>
+          <a:fontRef idx="minor">
+            <a:schemeClr val="lt1"/>
+          </a:fontRef>
+        </p:style>
+        <p:txBody>
+          <a:bodyPr rtlCol="0" anchor="ctr"/>
+          <a:lstStyle/>
+          <a:p>
+            <a:pPr algn="ctr"/>
+            <a:endParaRPr lang="en-US"/>
+          </a:p>
+        </p:txBody>
+      </p:sp>
+      <p:sp>
+        <p:nvSpPr>
+          <p:cNvPr id="19" name="TextBox 18">
+            <a:extLst>
+              <a:ext uri="{FF2B5EF4-FFF2-40B4-BE49-F238E27FC236}">
+                <a16:creationId xmlns:a16="http://schemas.microsoft.com/office/drawing/2014/main" id="{F09B08E4-2730-224D-B50A-9D727C0B2DC5}"/>
+              </a:ext>
+            </a:extLst>
+          </p:cNvPr>
+          <p:cNvSpPr txBox="1"/>
+          <p:nvPr/>
+        </p:nvSpPr>
+        <p:spPr>
+          <a:xfrm>
+            <a:off x="10688244" y="3003552"/>
+            <a:ext cx="934871" cy="369332"/>
+          </a:xfrm>
+          <a:prstGeom prst="rect">
+            <a:avLst/>
+          </a:prstGeom>
+          <a:solidFill>
+            <a:schemeClr val="bg2"/>
+          </a:solidFill>
+          <a:ln>
+            <a:solidFill>
+              <a:schemeClr val="bg2"/>
+            </a:solidFill>
+          </a:ln>
+        </p:spPr>
+        <p:txBody>
+          <a:bodyPr wrap="none" rtlCol="0">
+            <a:spAutoFit/>
+          </a:bodyPr>
+          <a:lstStyle/>
+          <a:p>
+            <a:r>
+              <a:rPr lang="en-US" dirty="0"/>
+              <a:t>timeout</a:t>
+            </a:r>
           </a:p>
         </p:txBody>
       </p:sp>
     </p:spTree>
     <p:extLst>
       <p:ext uri="{BB962C8B-B14F-4D97-AF65-F5344CB8AC3E}">
-        <p14:creationId xmlns:p14="http://schemas.microsoft.com/office/powerpoint/2010/main" val="3695787322"/>
+        <p14:creationId xmlns:p14="http://schemas.microsoft.com/office/powerpoint/2010/main" val="3640159312"/>
       </p:ext>
     </p:extLst>
   </p:cSld>
   <p:clrMapOvr>
     <a:masterClrMapping/>
   </p:clrMapOvr>
+  <p:timing>
+    <p:tnLst>
+      <p:par>
+        <p:cTn id="1" dur="indefinite" restart="never" nodeType="tmRoot">
+          <p:childTnLst>
+            <p:seq concurrent="1" nextAc="seek">
+              <p:cTn id="2" dur="indefinite" nodeType="mainSeq">
+                <p:childTnLst>
+                  <p:par>
+                    <p:cTn id="3" fill="hold">
+                      <p:stCondLst>
+                        <p:cond delay="indefinite"/>
+                      </p:stCondLst>
+                      <p:childTnLst>
+                        <p:par>
+                          <p:cTn id="4" fill="hold">
+                            <p:stCondLst>
+                              <p:cond delay="0"/>
+                            </p:stCondLst>
+                            <p:childTnLst>
+                              <p:par>
+                                <p:cTn id="5" presetID="10" presetClass="entr" presetSubtype="0" fill="hold" nodeType="clickEffect">
+                                  <p:stCondLst>
+                                    <p:cond delay="0"/>
+                                  </p:stCondLst>
+                                  <p:childTnLst>
+                                    <p:set>
+                                      <p:cBhvr>
+                                        <p:cTn id="6" dur="1" fill="hold">
+                                          <p:stCondLst>
+                                            <p:cond delay="0"/>
+                                          </p:stCondLst>
+                                        </p:cTn>
+                                        <p:tgtEl>
+                                          <p:spTgt spid="5"/>
+                                        </p:tgtEl>
+                                        <p:attrNameLst>
+                                          <p:attrName>style.visibility</p:attrName>
+                                        </p:attrNameLst>
+                                      </p:cBhvr>
+                                      <p:to>
+                                        <p:strVal val="visible"/>
+                                      </p:to>
+                                    </p:set>
+                                    <p:animEffect transition="in" filter="fade">
+                                      <p:cBhvr>
+                                        <p:cTn id="7" dur="500"/>
+                                        <p:tgtEl>
+                                          <p:spTgt spid="5"/>
+                                        </p:tgtEl>
+                                      </p:cBhvr>
+                                    </p:animEffect>
+                                  </p:childTnLst>
+                                </p:cTn>
+                              </p:par>
+                              <p:par>
+                                <p:cTn id="8" presetID="10" presetClass="entr" presetSubtype="0" fill="hold" grpId="0" nodeType="withEffect">
+                                  <p:stCondLst>
+                                    <p:cond delay="0"/>
+                                  </p:stCondLst>
+                                  <p:childTnLst>
+                                    <p:set>
+                                      <p:cBhvr>
+                                        <p:cTn id="9" dur="1" fill="hold">
+                                          <p:stCondLst>
+                                            <p:cond delay="0"/>
+                                          </p:stCondLst>
+                                        </p:cTn>
+                                        <p:tgtEl>
+                                          <p:spTgt spid="7"/>
+                                        </p:tgtEl>
+                                        <p:attrNameLst>
+                                          <p:attrName>style.visibility</p:attrName>
+                                        </p:attrNameLst>
+                                      </p:cBhvr>
+                                      <p:to>
+                                        <p:strVal val="visible"/>
+                                      </p:to>
+                                    </p:set>
+                                    <p:animEffect transition="in" filter="fade">
+                                      <p:cBhvr>
+                                        <p:cTn id="10" dur="500"/>
+                                        <p:tgtEl>
+                                          <p:spTgt spid="7"/>
+                                        </p:tgtEl>
+                                      </p:cBhvr>
+                                    </p:animEffect>
+                                  </p:childTnLst>
+                                </p:cTn>
+                              </p:par>
+                              <p:par>
+                                <p:cTn id="11" presetID="10" presetClass="entr" presetSubtype="0" fill="hold" grpId="0" nodeType="withEffect">
+                                  <p:stCondLst>
+                                    <p:cond delay="0"/>
+                                  </p:stCondLst>
+                                  <p:childTnLst>
+                                    <p:set>
+                                      <p:cBhvr>
+                                        <p:cTn id="12" dur="1" fill="hold">
+                                          <p:stCondLst>
+                                            <p:cond delay="0"/>
+                                          </p:stCondLst>
+                                        </p:cTn>
+                                        <p:tgtEl>
+                                          <p:spTgt spid="6"/>
+                                        </p:tgtEl>
+                                        <p:attrNameLst>
+                                          <p:attrName>style.visibility</p:attrName>
+                                        </p:attrNameLst>
+                                      </p:cBhvr>
+                                      <p:to>
+                                        <p:strVal val="visible"/>
+                                      </p:to>
+                                    </p:set>
+                                    <p:animEffect transition="in" filter="fade">
+                                      <p:cBhvr>
+                                        <p:cTn id="13" dur="500"/>
+                                        <p:tgtEl>
+                                          <p:spTgt spid="6"/>
+                                        </p:tgtEl>
+                                      </p:cBhvr>
+                                    </p:animEffect>
+                                  </p:childTnLst>
+                                </p:cTn>
+                              </p:par>
+                            </p:childTnLst>
+                          </p:cTn>
+                        </p:par>
+                      </p:childTnLst>
+                    </p:cTn>
+                  </p:par>
+                  <p:par>
+                    <p:cTn id="14" fill="hold">
+                      <p:stCondLst>
+                        <p:cond delay="indefinite"/>
+                      </p:stCondLst>
+                      <p:childTnLst>
+                        <p:par>
+                          <p:cTn id="15" fill="hold">
+                            <p:stCondLst>
+                              <p:cond delay="0"/>
+                            </p:stCondLst>
+                            <p:childTnLst>
+                              <p:par>
+                                <p:cTn id="16" presetID="53" presetClass="entr" presetSubtype="16" fill="hold" grpId="0" nodeType="clickEffect">
+                                  <p:stCondLst>
+                                    <p:cond delay="0"/>
+                                  </p:stCondLst>
+                                  <p:childTnLst>
+                                    <p:set>
+                                      <p:cBhvr>
+                                        <p:cTn id="17" dur="1" fill="hold">
+                                          <p:stCondLst>
+                                            <p:cond delay="0"/>
+                                          </p:stCondLst>
+                                        </p:cTn>
+                                        <p:tgtEl>
+                                          <p:spTgt spid="8"/>
+                                        </p:tgtEl>
+                                        <p:attrNameLst>
+                                          <p:attrName>style.visibility</p:attrName>
+                                        </p:attrNameLst>
+                                      </p:cBhvr>
+                                      <p:to>
+                                        <p:strVal val="visible"/>
+                                      </p:to>
+                                    </p:set>
+                                    <p:anim calcmode="lin" valueType="num">
+                                      <p:cBhvr>
+                                        <p:cTn id="18" dur="500" fill="hold"/>
+                                        <p:tgtEl>
+                                          <p:spTgt spid="8"/>
+                                        </p:tgtEl>
+                                        <p:attrNameLst>
+                                          <p:attrName>ppt_w</p:attrName>
+                                        </p:attrNameLst>
+                                      </p:cBhvr>
+                                      <p:tavLst>
+                                        <p:tav tm="0">
+                                          <p:val>
+                                            <p:fltVal val="0"/>
+                                          </p:val>
+                                        </p:tav>
+                                        <p:tav tm="100000">
+                                          <p:val>
+                                            <p:strVal val="#ppt_w"/>
+                                          </p:val>
+                                        </p:tav>
+                                      </p:tavLst>
+                                    </p:anim>
+                                    <p:anim calcmode="lin" valueType="num">
+                                      <p:cBhvr>
+                                        <p:cTn id="19" dur="500" fill="hold"/>
+                                        <p:tgtEl>
+                                          <p:spTgt spid="8"/>
+                                        </p:tgtEl>
+                                        <p:attrNameLst>
+                                          <p:attrName>ppt_h</p:attrName>
+                                        </p:attrNameLst>
+                                      </p:cBhvr>
+                                      <p:tavLst>
+                                        <p:tav tm="0">
+                                          <p:val>
+                                            <p:fltVal val="0"/>
+                                          </p:val>
+                                        </p:tav>
+                                        <p:tav tm="100000">
+                                          <p:val>
+                                            <p:strVal val="#ppt_h"/>
+                                          </p:val>
+                                        </p:tav>
+                                      </p:tavLst>
+                                    </p:anim>
+                                    <p:animEffect transition="in" filter="fade">
+                                      <p:cBhvr>
+                                        <p:cTn id="20" dur="500"/>
+                                        <p:tgtEl>
+                                          <p:spTgt spid="8"/>
+                                        </p:tgtEl>
+                                      </p:cBhvr>
+                                    </p:animEffect>
+                                  </p:childTnLst>
+                                </p:cTn>
+                              </p:par>
+                              <p:par>
+                                <p:cTn id="21" presetID="53" presetClass="entr" presetSubtype="16" fill="hold" grpId="0" nodeType="withEffect">
+                                  <p:stCondLst>
+                                    <p:cond delay="0"/>
+                                  </p:stCondLst>
+                                  <p:childTnLst>
+                                    <p:set>
+                                      <p:cBhvr>
+                                        <p:cTn id="22" dur="1" fill="hold">
+                                          <p:stCondLst>
+                                            <p:cond delay="0"/>
+                                          </p:stCondLst>
+                                        </p:cTn>
+                                        <p:tgtEl>
+                                          <p:spTgt spid="9"/>
+                                        </p:tgtEl>
+                                        <p:attrNameLst>
+                                          <p:attrName>style.visibility</p:attrName>
+                                        </p:attrNameLst>
+                                      </p:cBhvr>
+                                      <p:to>
+                                        <p:strVal val="visible"/>
+                                      </p:to>
+                                    </p:set>
+                                    <p:anim calcmode="lin" valueType="num">
+                                      <p:cBhvr>
+                                        <p:cTn id="23" dur="500" fill="hold"/>
+                                        <p:tgtEl>
+                                          <p:spTgt spid="9"/>
+                                        </p:tgtEl>
+                                        <p:attrNameLst>
+                                          <p:attrName>ppt_w</p:attrName>
+                                        </p:attrNameLst>
+                                      </p:cBhvr>
+                                      <p:tavLst>
+                                        <p:tav tm="0">
+                                          <p:val>
+                                            <p:fltVal val="0"/>
+                                          </p:val>
+                                        </p:tav>
+                                        <p:tav tm="100000">
+                                          <p:val>
+                                            <p:strVal val="#ppt_w"/>
+                                          </p:val>
+                                        </p:tav>
+                                      </p:tavLst>
+                                    </p:anim>
+                                    <p:anim calcmode="lin" valueType="num">
+                                      <p:cBhvr>
+                                        <p:cTn id="24" dur="500" fill="hold"/>
+                                        <p:tgtEl>
+                                          <p:spTgt spid="9"/>
+                                        </p:tgtEl>
+                                        <p:attrNameLst>
+                                          <p:attrName>ppt_h</p:attrName>
+                                        </p:attrNameLst>
+                                      </p:cBhvr>
+                                      <p:tavLst>
+                                        <p:tav tm="0">
+                                          <p:val>
+                                            <p:fltVal val="0"/>
+                                          </p:val>
+                                        </p:tav>
+                                        <p:tav tm="100000">
+                                          <p:val>
+                                            <p:strVal val="#ppt_h"/>
+                                          </p:val>
+                                        </p:tav>
+                                      </p:tavLst>
+                                    </p:anim>
+                                    <p:animEffect transition="in" filter="fade">
+                                      <p:cBhvr>
+                                        <p:cTn id="25" dur="500"/>
+                                        <p:tgtEl>
+                                          <p:spTgt spid="9"/>
+                                        </p:tgtEl>
+                                      </p:cBhvr>
+                                    </p:animEffect>
+                                  </p:childTnLst>
+                                </p:cTn>
+                              </p:par>
+                              <p:par>
+                                <p:cTn id="26" presetID="53" presetClass="entr" presetSubtype="16" fill="hold" grpId="0" nodeType="withEffect">
+                                  <p:stCondLst>
+                                    <p:cond delay="0"/>
+                                  </p:stCondLst>
+                                  <p:childTnLst>
+                                    <p:set>
+                                      <p:cBhvr>
+                                        <p:cTn id="27" dur="1" fill="hold">
+                                          <p:stCondLst>
+                                            <p:cond delay="0"/>
+                                          </p:stCondLst>
+                                        </p:cTn>
+                                        <p:tgtEl>
+                                          <p:spTgt spid="10"/>
+                                        </p:tgtEl>
+                                        <p:attrNameLst>
+                                          <p:attrName>style.visibility</p:attrName>
+                                        </p:attrNameLst>
+                                      </p:cBhvr>
+                                      <p:to>
+                                        <p:strVal val="visible"/>
+                                      </p:to>
+                                    </p:set>
+                                    <p:anim calcmode="lin" valueType="num">
+                                      <p:cBhvr>
+                                        <p:cTn id="28" dur="500" fill="hold"/>
+                                        <p:tgtEl>
+                                          <p:spTgt spid="10"/>
+                                        </p:tgtEl>
+                                        <p:attrNameLst>
+                                          <p:attrName>ppt_w</p:attrName>
+                                        </p:attrNameLst>
+                                      </p:cBhvr>
+                                      <p:tavLst>
+                                        <p:tav tm="0">
+                                          <p:val>
+                                            <p:fltVal val="0"/>
+                                          </p:val>
+                                        </p:tav>
+                                        <p:tav tm="100000">
+                                          <p:val>
+                                            <p:strVal val="#ppt_w"/>
+                                          </p:val>
+                                        </p:tav>
+                                      </p:tavLst>
+                                    </p:anim>
+                                    <p:anim calcmode="lin" valueType="num">
+                                      <p:cBhvr>
+                                        <p:cTn id="29" dur="500" fill="hold"/>
+                                        <p:tgtEl>
+                                          <p:spTgt spid="10"/>
+                                        </p:tgtEl>
+                                        <p:attrNameLst>
+                                          <p:attrName>ppt_h</p:attrName>
+                                        </p:attrNameLst>
+                                      </p:cBhvr>
+                                      <p:tavLst>
+                                        <p:tav tm="0">
+                                          <p:val>
+                                            <p:fltVal val="0"/>
+                                          </p:val>
+                                        </p:tav>
+                                        <p:tav tm="100000">
+                                          <p:val>
+                                            <p:strVal val="#ppt_h"/>
+                                          </p:val>
+                                        </p:tav>
+                                      </p:tavLst>
+                                    </p:anim>
+                                    <p:animEffect transition="in" filter="fade">
+                                      <p:cBhvr>
+                                        <p:cTn id="30" dur="500"/>
+                                        <p:tgtEl>
+                                          <p:spTgt spid="10"/>
+                                        </p:tgtEl>
+                                      </p:cBhvr>
+                                    </p:animEffect>
+                                  </p:childTnLst>
+                                </p:cTn>
+                              </p:par>
+                              <p:par>
+                                <p:cTn id="31" presetID="53" presetClass="entr" presetSubtype="16" fill="hold" grpId="0" nodeType="withEffect">
+                                  <p:stCondLst>
+                                    <p:cond delay="0"/>
+                                  </p:stCondLst>
+                                  <p:childTnLst>
+                                    <p:set>
+                                      <p:cBhvr>
+                                        <p:cTn id="32" dur="1" fill="hold">
+                                          <p:stCondLst>
+                                            <p:cond delay="0"/>
+                                          </p:stCondLst>
+                                        </p:cTn>
+                                        <p:tgtEl>
+                                          <p:spTgt spid="11"/>
+                                        </p:tgtEl>
+                                        <p:attrNameLst>
+                                          <p:attrName>style.visibility</p:attrName>
+                                        </p:attrNameLst>
+                                      </p:cBhvr>
+                                      <p:to>
+                                        <p:strVal val="visible"/>
+                                      </p:to>
+                                    </p:set>
+                                    <p:anim calcmode="lin" valueType="num">
+                                      <p:cBhvr>
+                                        <p:cTn id="33" dur="500" fill="hold"/>
+                                        <p:tgtEl>
+                                          <p:spTgt spid="11"/>
+                                        </p:tgtEl>
+                                        <p:attrNameLst>
+                                          <p:attrName>ppt_w</p:attrName>
+                                        </p:attrNameLst>
+                                      </p:cBhvr>
+                                      <p:tavLst>
+                                        <p:tav tm="0">
+                                          <p:val>
+                                            <p:fltVal val="0"/>
+                                          </p:val>
+                                        </p:tav>
+                                        <p:tav tm="100000">
+                                          <p:val>
+                                            <p:strVal val="#ppt_w"/>
+                                          </p:val>
+                                        </p:tav>
+                                      </p:tavLst>
+                                    </p:anim>
+                                    <p:anim calcmode="lin" valueType="num">
+                                      <p:cBhvr>
+                                        <p:cTn id="34" dur="500" fill="hold"/>
+                                        <p:tgtEl>
+                                          <p:spTgt spid="11"/>
+                                        </p:tgtEl>
+                                        <p:attrNameLst>
+                                          <p:attrName>ppt_h</p:attrName>
+                                        </p:attrNameLst>
+                                      </p:cBhvr>
+                                      <p:tavLst>
+                                        <p:tav tm="0">
+                                          <p:val>
+                                            <p:fltVal val="0"/>
+                                          </p:val>
+                                        </p:tav>
+                                        <p:tav tm="100000">
+                                          <p:val>
+                                            <p:strVal val="#ppt_h"/>
+                                          </p:val>
+                                        </p:tav>
+                                      </p:tavLst>
+                                    </p:anim>
+                                    <p:animEffect transition="in" filter="fade">
+                                      <p:cBhvr>
+                                        <p:cTn id="35" dur="500"/>
+                                        <p:tgtEl>
+                                          <p:spTgt spid="11"/>
+                                        </p:tgtEl>
+                                      </p:cBhvr>
+                                    </p:animEffect>
+                                  </p:childTnLst>
+                                </p:cTn>
+                              </p:par>
+                              <p:par>
+                                <p:cTn id="36" presetID="53" presetClass="entr" presetSubtype="16" fill="hold" grpId="0" nodeType="withEffect">
+                                  <p:stCondLst>
+                                    <p:cond delay="0"/>
+                                  </p:stCondLst>
+                                  <p:childTnLst>
+                                    <p:set>
+                                      <p:cBhvr>
+                                        <p:cTn id="37" dur="1" fill="hold">
+                                          <p:stCondLst>
+                                            <p:cond delay="0"/>
+                                          </p:stCondLst>
+                                        </p:cTn>
+                                        <p:tgtEl>
+                                          <p:spTgt spid="12"/>
+                                        </p:tgtEl>
+                                        <p:attrNameLst>
+                                          <p:attrName>style.visibility</p:attrName>
+                                        </p:attrNameLst>
+                                      </p:cBhvr>
+                                      <p:to>
+                                        <p:strVal val="visible"/>
+                                      </p:to>
+                                    </p:set>
+                                    <p:anim calcmode="lin" valueType="num">
+                                      <p:cBhvr>
+                                        <p:cTn id="38" dur="500" fill="hold"/>
+                                        <p:tgtEl>
+                                          <p:spTgt spid="12"/>
+                                        </p:tgtEl>
+                                        <p:attrNameLst>
+                                          <p:attrName>ppt_w</p:attrName>
+                                        </p:attrNameLst>
+                                      </p:cBhvr>
+                                      <p:tavLst>
+                                        <p:tav tm="0">
+                                          <p:val>
+                                            <p:fltVal val="0"/>
+                                          </p:val>
+                                        </p:tav>
+                                        <p:tav tm="100000">
+                                          <p:val>
+                                            <p:strVal val="#ppt_w"/>
+                                          </p:val>
+                                        </p:tav>
+                                      </p:tavLst>
+                                    </p:anim>
+                                    <p:anim calcmode="lin" valueType="num">
+                                      <p:cBhvr>
+                                        <p:cTn id="39" dur="500" fill="hold"/>
+                                        <p:tgtEl>
+                                          <p:spTgt spid="12"/>
+                                        </p:tgtEl>
+                                        <p:attrNameLst>
+                                          <p:attrName>ppt_h</p:attrName>
+                                        </p:attrNameLst>
+                                      </p:cBhvr>
+                                      <p:tavLst>
+                                        <p:tav tm="0">
+                                          <p:val>
+                                            <p:fltVal val="0"/>
+                                          </p:val>
+                                        </p:tav>
+                                        <p:tav tm="100000">
+                                          <p:val>
+                                            <p:strVal val="#ppt_h"/>
+                                          </p:val>
+                                        </p:tav>
+                                      </p:tavLst>
+                                    </p:anim>
+                                    <p:animEffect transition="in" filter="fade">
+                                      <p:cBhvr>
+                                        <p:cTn id="40" dur="500"/>
+                                        <p:tgtEl>
+                                          <p:spTgt spid="12"/>
+                                        </p:tgtEl>
+                                      </p:cBhvr>
+                                    </p:animEffect>
+                                  </p:childTnLst>
+                                </p:cTn>
+                              </p:par>
+                              <p:par>
+                                <p:cTn id="41" presetID="53" presetClass="entr" presetSubtype="16" fill="hold" grpId="0" nodeType="withEffect">
+                                  <p:stCondLst>
+                                    <p:cond delay="0"/>
+                                  </p:stCondLst>
+                                  <p:childTnLst>
+                                    <p:set>
+                                      <p:cBhvr>
+                                        <p:cTn id="42" dur="1" fill="hold">
+                                          <p:stCondLst>
+                                            <p:cond delay="0"/>
+                                          </p:stCondLst>
+                                        </p:cTn>
+                                        <p:tgtEl>
+                                          <p:spTgt spid="13"/>
+                                        </p:tgtEl>
+                                        <p:attrNameLst>
+                                          <p:attrName>style.visibility</p:attrName>
+                                        </p:attrNameLst>
+                                      </p:cBhvr>
+                                      <p:to>
+                                        <p:strVal val="visible"/>
+                                      </p:to>
+                                    </p:set>
+                                    <p:anim calcmode="lin" valueType="num">
+                                      <p:cBhvr>
+                                        <p:cTn id="43" dur="500" fill="hold"/>
+                                        <p:tgtEl>
+                                          <p:spTgt spid="13"/>
+                                        </p:tgtEl>
+                                        <p:attrNameLst>
+                                          <p:attrName>ppt_w</p:attrName>
+                                        </p:attrNameLst>
+                                      </p:cBhvr>
+                                      <p:tavLst>
+                                        <p:tav tm="0">
+                                          <p:val>
+                                            <p:fltVal val="0"/>
+                                          </p:val>
+                                        </p:tav>
+                                        <p:tav tm="100000">
+                                          <p:val>
+                                            <p:strVal val="#ppt_w"/>
+                                          </p:val>
+                                        </p:tav>
+                                      </p:tavLst>
+                                    </p:anim>
+                                    <p:anim calcmode="lin" valueType="num">
+                                      <p:cBhvr>
+                                        <p:cTn id="44" dur="500" fill="hold"/>
+                                        <p:tgtEl>
+                                          <p:spTgt spid="13"/>
+                                        </p:tgtEl>
+                                        <p:attrNameLst>
+                                          <p:attrName>ppt_h</p:attrName>
+                                        </p:attrNameLst>
+                                      </p:cBhvr>
+                                      <p:tavLst>
+                                        <p:tav tm="0">
+                                          <p:val>
+                                            <p:fltVal val="0"/>
+                                          </p:val>
+                                        </p:tav>
+                                        <p:tav tm="100000">
+                                          <p:val>
+                                            <p:strVal val="#ppt_h"/>
+                                          </p:val>
+                                        </p:tav>
+                                      </p:tavLst>
+                                    </p:anim>
+                                    <p:animEffect transition="in" filter="fade">
+                                      <p:cBhvr>
+                                        <p:cTn id="45" dur="500"/>
+                                        <p:tgtEl>
+                                          <p:spTgt spid="13"/>
+                                        </p:tgtEl>
+                                      </p:cBhvr>
+                                    </p:animEffect>
+                                  </p:childTnLst>
+                                </p:cTn>
+                              </p:par>
+                              <p:par>
+                                <p:cTn id="46" presetID="53" presetClass="entr" presetSubtype="16" fill="hold" grpId="0" nodeType="withEffect">
+                                  <p:stCondLst>
+                                    <p:cond delay="0"/>
+                                  </p:stCondLst>
+                                  <p:childTnLst>
+                                    <p:set>
+                                      <p:cBhvr>
+                                        <p:cTn id="47" dur="1" fill="hold">
+                                          <p:stCondLst>
+                                            <p:cond delay="0"/>
+                                          </p:stCondLst>
+                                        </p:cTn>
+                                        <p:tgtEl>
+                                          <p:spTgt spid="14"/>
+                                        </p:tgtEl>
+                                        <p:attrNameLst>
+                                          <p:attrName>style.visibility</p:attrName>
+                                        </p:attrNameLst>
+                                      </p:cBhvr>
+                                      <p:to>
+                                        <p:strVal val="visible"/>
+                                      </p:to>
+                                    </p:set>
+                                    <p:anim calcmode="lin" valueType="num">
+                                      <p:cBhvr>
+                                        <p:cTn id="48" dur="500" fill="hold"/>
+                                        <p:tgtEl>
+                                          <p:spTgt spid="14"/>
+                                        </p:tgtEl>
+                                        <p:attrNameLst>
+                                          <p:attrName>ppt_w</p:attrName>
+                                        </p:attrNameLst>
+                                      </p:cBhvr>
+                                      <p:tavLst>
+                                        <p:tav tm="0">
+                                          <p:val>
+                                            <p:fltVal val="0"/>
+                                          </p:val>
+                                        </p:tav>
+                                        <p:tav tm="100000">
+                                          <p:val>
+                                            <p:strVal val="#ppt_w"/>
+                                          </p:val>
+                                        </p:tav>
+                                      </p:tavLst>
+                                    </p:anim>
+                                    <p:anim calcmode="lin" valueType="num">
+                                      <p:cBhvr>
+                                        <p:cTn id="49" dur="500" fill="hold"/>
+                                        <p:tgtEl>
+                                          <p:spTgt spid="14"/>
+                                        </p:tgtEl>
+                                        <p:attrNameLst>
+                                          <p:attrName>ppt_h</p:attrName>
+                                        </p:attrNameLst>
+                                      </p:cBhvr>
+                                      <p:tavLst>
+                                        <p:tav tm="0">
+                                          <p:val>
+                                            <p:fltVal val="0"/>
+                                          </p:val>
+                                        </p:tav>
+                                        <p:tav tm="100000">
+                                          <p:val>
+                                            <p:strVal val="#ppt_h"/>
+                                          </p:val>
+                                        </p:tav>
+                                      </p:tavLst>
+                                    </p:anim>
+                                    <p:animEffect transition="in" filter="fade">
+                                      <p:cBhvr>
+                                        <p:cTn id="50" dur="500"/>
+                                        <p:tgtEl>
+                                          <p:spTgt spid="14"/>
+                                        </p:tgtEl>
+                                      </p:cBhvr>
+                                    </p:animEffect>
+                                  </p:childTnLst>
+                                </p:cTn>
+                              </p:par>
+                              <p:par>
+                                <p:cTn id="51" presetID="53" presetClass="entr" presetSubtype="16" fill="hold" grpId="0" nodeType="withEffect">
+                                  <p:stCondLst>
+                                    <p:cond delay="0"/>
+                                  </p:stCondLst>
+                                  <p:childTnLst>
+                                    <p:set>
+                                      <p:cBhvr>
+                                        <p:cTn id="52" dur="1" fill="hold">
+                                          <p:stCondLst>
+                                            <p:cond delay="0"/>
+                                          </p:stCondLst>
+                                        </p:cTn>
+                                        <p:tgtEl>
+                                          <p:spTgt spid="15"/>
+                                        </p:tgtEl>
+                                        <p:attrNameLst>
+                                          <p:attrName>style.visibility</p:attrName>
+                                        </p:attrNameLst>
+                                      </p:cBhvr>
+                                      <p:to>
+                                        <p:strVal val="visible"/>
+                                      </p:to>
+                                    </p:set>
+                                    <p:anim calcmode="lin" valueType="num">
+                                      <p:cBhvr>
+                                        <p:cTn id="53" dur="500" fill="hold"/>
+                                        <p:tgtEl>
+                                          <p:spTgt spid="15"/>
+                                        </p:tgtEl>
+                                        <p:attrNameLst>
+                                          <p:attrName>ppt_w</p:attrName>
+                                        </p:attrNameLst>
+                                      </p:cBhvr>
+                                      <p:tavLst>
+                                        <p:tav tm="0">
+                                          <p:val>
+                                            <p:fltVal val="0"/>
+                                          </p:val>
+                                        </p:tav>
+                                        <p:tav tm="100000">
+                                          <p:val>
+                                            <p:strVal val="#ppt_w"/>
+                                          </p:val>
+                                        </p:tav>
+                                      </p:tavLst>
+                                    </p:anim>
+                                    <p:anim calcmode="lin" valueType="num">
+                                      <p:cBhvr>
+                                        <p:cTn id="54" dur="500" fill="hold"/>
+                                        <p:tgtEl>
+                                          <p:spTgt spid="15"/>
+                                        </p:tgtEl>
+                                        <p:attrNameLst>
+                                          <p:attrName>ppt_h</p:attrName>
+                                        </p:attrNameLst>
+                                      </p:cBhvr>
+                                      <p:tavLst>
+                                        <p:tav tm="0">
+                                          <p:val>
+                                            <p:fltVal val="0"/>
+                                          </p:val>
+                                        </p:tav>
+                                        <p:tav tm="100000">
+                                          <p:val>
+                                            <p:strVal val="#ppt_h"/>
+                                          </p:val>
+                                        </p:tav>
+                                      </p:tavLst>
+                                    </p:anim>
+                                    <p:animEffect transition="in" filter="fade">
+                                      <p:cBhvr>
+                                        <p:cTn id="55" dur="500"/>
+                                        <p:tgtEl>
+                                          <p:spTgt spid="15"/>
+                                        </p:tgtEl>
+                                      </p:cBhvr>
+                                    </p:animEffect>
+                                  </p:childTnLst>
+                                </p:cTn>
+                              </p:par>
+                              <p:par>
+                                <p:cTn id="56" presetID="53" presetClass="entr" presetSubtype="16" fill="hold" grpId="0" nodeType="withEffect">
+                                  <p:stCondLst>
+                                    <p:cond delay="0"/>
+                                  </p:stCondLst>
+                                  <p:childTnLst>
+                                    <p:set>
+                                      <p:cBhvr>
+                                        <p:cTn id="57" dur="1" fill="hold">
+                                          <p:stCondLst>
+                                            <p:cond delay="0"/>
+                                          </p:stCondLst>
+                                        </p:cTn>
+                                        <p:tgtEl>
+                                          <p:spTgt spid="16"/>
+                                        </p:tgtEl>
+                                        <p:attrNameLst>
+                                          <p:attrName>style.visibility</p:attrName>
+                                        </p:attrNameLst>
+                                      </p:cBhvr>
+                                      <p:to>
+                                        <p:strVal val="visible"/>
+                                      </p:to>
+                                    </p:set>
+                                    <p:anim calcmode="lin" valueType="num">
+                                      <p:cBhvr>
+                                        <p:cTn id="58" dur="500" fill="hold"/>
+                                        <p:tgtEl>
+                                          <p:spTgt spid="16"/>
+                                        </p:tgtEl>
+                                        <p:attrNameLst>
+                                          <p:attrName>ppt_w</p:attrName>
+                                        </p:attrNameLst>
+                                      </p:cBhvr>
+                                      <p:tavLst>
+                                        <p:tav tm="0">
+                                          <p:val>
+                                            <p:fltVal val="0"/>
+                                          </p:val>
+                                        </p:tav>
+                                        <p:tav tm="100000">
+                                          <p:val>
+                                            <p:strVal val="#ppt_w"/>
+                                          </p:val>
+                                        </p:tav>
+                                      </p:tavLst>
+                                    </p:anim>
+                                    <p:anim calcmode="lin" valueType="num">
+                                      <p:cBhvr>
+                                        <p:cTn id="59" dur="500" fill="hold"/>
+                                        <p:tgtEl>
+                                          <p:spTgt spid="16"/>
+                                        </p:tgtEl>
+                                        <p:attrNameLst>
+                                          <p:attrName>ppt_h</p:attrName>
+                                        </p:attrNameLst>
+                                      </p:cBhvr>
+                                      <p:tavLst>
+                                        <p:tav tm="0">
+                                          <p:val>
+                                            <p:fltVal val="0"/>
+                                          </p:val>
+                                        </p:tav>
+                                        <p:tav tm="100000">
+                                          <p:val>
+                                            <p:strVal val="#ppt_h"/>
+                                          </p:val>
+                                        </p:tav>
+                                      </p:tavLst>
+                                    </p:anim>
+                                    <p:animEffect transition="in" filter="fade">
+                                      <p:cBhvr>
+                                        <p:cTn id="60" dur="500"/>
+                                        <p:tgtEl>
+                                          <p:spTgt spid="16"/>
+                                        </p:tgtEl>
+                                      </p:cBhvr>
+                                    </p:animEffect>
+                                  </p:childTnLst>
+                                </p:cTn>
+                              </p:par>
+                              <p:par>
+                                <p:cTn id="61" presetID="53" presetClass="entr" presetSubtype="16" fill="hold" grpId="0" nodeType="withEffect">
+                                  <p:stCondLst>
+                                    <p:cond delay="0"/>
+                                  </p:stCondLst>
+                                  <p:childTnLst>
+                                    <p:set>
+                                      <p:cBhvr>
+                                        <p:cTn id="62" dur="1" fill="hold">
+                                          <p:stCondLst>
+                                            <p:cond delay="0"/>
+                                          </p:stCondLst>
+                                        </p:cTn>
+                                        <p:tgtEl>
+                                          <p:spTgt spid="17"/>
+                                        </p:tgtEl>
+                                        <p:attrNameLst>
+                                          <p:attrName>style.visibility</p:attrName>
+                                        </p:attrNameLst>
+                                      </p:cBhvr>
+                                      <p:to>
+                                        <p:strVal val="visible"/>
+                                      </p:to>
+                                    </p:set>
+                                    <p:anim calcmode="lin" valueType="num">
+                                      <p:cBhvr>
+                                        <p:cTn id="63" dur="500" fill="hold"/>
+                                        <p:tgtEl>
+                                          <p:spTgt spid="17"/>
+                                        </p:tgtEl>
+                                        <p:attrNameLst>
+                                          <p:attrName>ppt_w</p:attrName>
+                                        </p:attrNameLst>
+                                      </p:cBhvr>
+                                      <p:tavLst>
+                                        <p:tav tm="0">
+                                          <p:val>
+                                            <p:fltVal val="0"/>
+                                          </p:val>
+                                        </p:tav>
+                                        <p:tav tm="100000">
+                                          <p:val>
+                                            <p:strVal val="#ppt_w"/>
+                                          </p:val>
+                                        </p:tav>
+                                      </p:tavLst>
+                                    </p:anim>
+                                    <p:anim calcmode="lin" valueType="num">
+                                      <p:cBhvr>
+                                        <p:cTn id="64" dur="500" fill="hold"/>
+                                        <p:tgtEl>
+                                          <p:spTgt spid="17"/>
+                                        </p:tgtEl>
+                                        <p:attrNameLst>
+                                          <p:attrName>ppt_h</p:attrName>
+                                        </p:attrNameLst>
+                                      </p:cBhvr>
+                                      <p:tavLst>
+                                        <p:tav tm="0">
+                                          <p:val>
+                                            <p:fltVal val="0"/>
+                                          </p:val>
+                                        </p:tav>
+                                        <p:tav tm="100000">
+                                          <p:val>
+                                            <p:strVal val="#ppt_h"/>
+                                          </p:val>
+                                        </p:tav>
+                                      </p:tavLst>
+                                    </p:anim>
+                                    <p:animEffect transition="in" filter="fade">
+                                      <p:cBhvr>
+                                        <p:cTn id="65" dur="500"/>
+                                        <p:tgtEl>
+                                          <p:spTgt spid="17"/>
+                                        </p:tgtEl>
+                                      </p:cBhvr>
+                                    </p:animEffect>
+                                  </p:childTnLst>
+                                </p:cTn>
+                              </p:par>
+                            </p:childTnLst>
+                          </p:cTn>
+                        </p:par>
+                      </p:childTnLst>
+                    </p:cTn>
+                  </p:par>
+                  <p:par>
+                    <p:cTn id="66" fill="hold">
+                      <p:stCondLst>
+                        <p:cond delay="indefinite"/>
+                      </p:stCondLst>
+                      <p:childTnLst>
+                        <p:par>
+                          <p:cTn id="67" fill="hold">
+                            <p:stCondLst>
+                              <p:cond delay="0"/>
+                            </p:stCondLst>
+                            <p:childTnLst>
+                              <p:par>
+                                <p:cTn id="68" presetID="10" presetClass="entr" presetSubtype="0" fill="hold" grpId="0" nodeType="clickEffect">
+                                  <p:stCondLst>
+                                    <p:cond delay="0"/>
+                                  </p:stCondLst>
+                                  <p:childTnLst>
+                                    <p:set>
+                                      <p:cBhvr>
+                                        <p:cTn id="69" dur="1" fill="hold">
+                                          <p:stCondLst>
+                                            <p:cond delay="0"/>
+                                          </p:stCondLst>
+                                        </p:cTn>
+                                        <p:tgtEl>
+                                          <p:spTgt spid="19"/>
+                                        </p:tgtEl>
+                                        <p:attrNameLst>
+                                          <p:attrName>style.visibility</p:attrName>
+                                        </p:attrNameLst>
+                                      </p:cBhvr>
+                                      <p:to>
+                                        <p:strVal val="visible"/>
+                                      </p:to>
+                                    </p:set>
+                                    <p:animEffect transition="in" filter="fade">
+                                      <p:cBhvr>
+                                        <p:cTn id="70" dur="500"/>
+                                        <p:tgtEl>
+                                          <p:spTgt spid="19"/>
+                                        </p:tgtEl>
+                                      </p:cBhvr>
+                                    </p:animEffect>
+                                  </p:childTnLst>
+                                </p:cTn>
+                              </p:par>
+                            </p:childTnLst>
+                          </p:cTn>
+                        </p:par>
+                      </p:childTnLst>
+                    </p:cTn>
+                  </p:par>
+                </p:childTnLst>
+              </p:cTn>
+              <p:prevCondLst>
+                <p:cond evt="onPrev" delay="0">
+                  <p:tgtEl>
+                    <p:sldTgt/>
+                  </p:tgtEl>
+                </p:cond>
+              </p:prevCondLst>
+              <p:nextCondLst>
+                <p:cond evt="onNext" delay="0">
+                  <p:tgtEl>
+                    <p:sldTgt/>
+                  </p:tgtEl>
+                </p:cond>
+              </p:nextCondLst>
+            </p:seq>
+          </p:childTnLst>
+        </p:cTn>
+      </p:par>
+    </p:tnLst>
+    <p:bldLst>
+      <p:bldP spid="6" grpId="0"/>
+      <p:bldP spid="7" grpId="0"/>
+      <p:bldP spid="8" grpId="0" animBg="1"/>
+      <p:bldP spid="9" grpId="0" animBg="1"/>
+      <p:bldP spid="10" grpId="0" animBg="1"/>
+      <p:bldP spid="11" grpId="0" animBg="1"/>
+      <p:bldP spid="12" grpId="0" animBg="1"/>
+      <p:bldP spid="13" grpId="0" animBg="1"/>
+      <p:bldP spid="14" grpId="0" animBg="1"/>
+      <p:bldP spid="15" grpId="0" animBg="1"/>
+      <p:bldP spid="16" grpId="0" animBg="1"/>
+      <p:bldP spid="17" grpId="0" animBg="1"/>
+      <p:bldP spid="19" grpId="0" animBg="1"/>
+    </p:bldLst>
+  </p:timing>
 </p:sld>
 </file>
 
@@ -18790,6 +20564,89 @@
 </file>
 
 <file path=ppt/slides/slide30.xml><?xml version="1.0" encoding="utf-8"?>
+<p:sld xmlns:a="http://schemas.openxmlformats.org/drawingml/2006/main" xmlns:r="http://schemas.openxmlformats.org/officeDocument/2006/relationships" xmlns:p="http://schemas.openxmlformats.org/presentationml/2006/main">
+  <p:cSld>
+    <p:spTree>
+      <p:nvGrpSpPr>
+        <p:cNvPr id="1" name=""/>
+        <p:cNvGrpSpPr/>
+        <p:nvPr/>
+      </p:nvGrpSpPr>
+      <p:grpSpPr>
+        <a:xfrm>
+          <a:off x="0" y="0"/>
+          <a:ext cx="0" cy="0"/>
+          <a:chOff x="0" y="0"/>
+          <a:chExt cx="0" cy="0"/>
+        </a:xfrm>
+      </p:grpSpPr>
+      <p:sp>
+        <p:nvSpPr>
+          <p:cNvPr id="2" name="Title 1"/>
+          <p:cNvSpPr>
+            <a:spLocks noGrp="1"/>
+          </p:cNvSpPr>
+          <p:nvPr>
+            <p:ph type="title"/>
+          </p:nvPr>
+        </p:nvSpPr>
+        <p:spPr/>
+        <p:txBody>
+          <a:bodyPr/>
+          <a:lstStyle/>
+          <a:p>
+            <a:r>
+              <a:rPr lang="en-GB" dirty="0"/>
+              <a:t>Demo 6</a:t>
+            </a:r>
+          </a:p>
+        </p:txBody>
+      </p:sp>
+      <p:sp>
+        <p:nvSpPr>
+          <p:cNvPr id="3" name="Content Placeholder 2"/>
+          <p:cNvSpPr>
+            <a:spLocks noGrp="1"/>
+          </p:cNvSpPr>
+          <p:nvPr>
+            <p:ph idx="1"/>
+          </p:nvPr>
+        </p:nvSpPr>
+        <p:spPr/>
+        <p:txBody>
+          <a:bodyPr/>
+          <a:lstStyle/>
+          <a:p>
+            <a:r>
+              <a:rPr lang="en-GB" dirty="0"/>
+              <a:t>Code for Gadget Controller</a:t>
+            </a:r>
+          </a:p>
+          <a:p>
+            <a:r>
+              <a:rPr lang="en-GB" dirty="0"/>
+              <a:t>Code for Game Engine</a:t>
+            </a:r>
+          </a:p>
+          <a:p>
+            <a:endParaRPr lang="en-GB" dirty="0"/>
+          </a:p>
+        </p:txBody>
+      </p:sp>
+    </p:spTree>
+    <p:extLst>
+      <p:ext uri="{BB962C8B-B14F-4D97-AF65-F5344CB8AC3E}">
+        <p14:creationId xmlns:p14="http://schemas.microsoft.com/office/powerpoint/2010/main" val="4034645509"/>
+      </p:ext>
+    </p:extLst>
+  </p:cSld>
+  <p:clrMapOvr>
+    <a:masterClrMapping/>
+  </p:clrMapOvr>
+</p:sld>
+</file>
+
+<file path=ppt/slides/slide31.xml><?xml version="1.0" encoding="utf-8"?>
 <p:sld xmlns:a="http://schemas.openxmlformats.org/drawingml/2006/main" xmlns:r="http://schemas.openxmlformats.org/officeDocument/2006/relationships" xmlns:p="http://schemas.openxmlformats.org/presentationml/2006/main">
   <p:cSld>
     <p:spTree>

</xml_diff>